<commit_message>
updated OS -> DM relationship
</commit_message>
<xml_diff>
--- a/images/diagrams.pptx
+++ b/images/diagrams.pptx
@@ -5,7 +5,7 @@
     <p:sldMasterId id="2147483648" r:id="rId1"/>
   </p:sldMasterIdLst>
   <p:notesMasterIdLst>
-    <p:notesMasterId r:id="rId21"/>
+    <p:notesMasterId r:id="rId22"/>
   </p:notesMasterIdLst>
   <p:sldIdLst>
     <p:sldId id="262" r:id="rId2"/>
@@ -27,6 +27,7 @@
     <p:sldId id="301" r:id="rId18"/>
     <p:sldId id="290" r:id="rId19"/>
     <p:sldId id="297" r:id="rId20"/>
+    <p:sldId id="302" r:id="rId21"/>
   </p:sldIdLst>
   <p:sldSz cx="12192000" cy="6858000"/>
   <p:notesSz cx="6858000" cy="9144000"/>
@@ -215,7 +216,7 @@
           <a:p>
             <a:fld id="{7E769850-0E43-CF4C-8EB8-DCE2C490B278}" type="datetimeFigureOut">
               <a:rPr lang="en-US" smtClean="0"/>
-              <a:t>9/2/17</a:t>
+              <a:t>4/9/18</a:t>
             </a:fld>
             <a:endParaRPr lang="en-US"/>
           </a:p>
@@ -279,38 +280,37 @@
           <a:p>
             <a:pPr lvl="0"/>
             <a:r>
-              <a:rPr lang="en-US" smtClean="0"/>
+              <a:rPr lang="en-US"/>
               <a:t>Click to edit Master text styles</a:t>
             </a:r>
           </a:p>
           <a:p>
             <a:pPr lvl="1"/>
             <a:r>
-              <a:rPr lang="en-US" smtClean="0"/>
+              <a:rPr lang="en-US"/>
               <a:t>Second level</a:t>
             </a:r>
           </a:p>
           <a:p>
             <a:pPr lvl="2"/>
             <a:r>
-              <a:rPr lang="en-US" smtClean="0"/>
+              <a:rPr lang="en-US"/>
               <a:t>Third level</a:t>
             </a:r>
           </a:p>
           <a:p>
             <a:pPr lvl="3"/>
             <a:r>
-              <a:rPr lang="en-US" smtClean="0"/>
+              <a:rPr lang="en-US"/>
               <a:t>Fourth level</a:t>
             </a:r>
           </a:p>
           <a:p>
             <a:pPr lvl="4"/>
             <a:r>
-              <a:rPr lang="en-US" smtClean="0"/>
+              <a:rPr lang="en-US"/>
               <a:t>Fifth level</a:t>
             </a:r>
-            <a:endParaRPr lang="en-US"/>
           </a:p>
         </p:txBody>
       </p:sp>
@@ -525,10 +525,9 @@
           </a:lstStyle>
           <a:p>
             <a:r>
-              <a:rPr lang="en-US" smtClean="0"/>
+              <a:rPr lang="en-US"/>
               <a:t>Click to edit Master title style</a:t>
             </a:r>
-            <a:endParaRPr lang="en-US"/>
           </a:p>
         </p:txBody>
       </p:sp>
@@ -590,10 +589,9 @@
           </a:lstStyle>
           <a:p>
             <a:r>
-              <a:rPr lang="en-US" smtClean="0"/>
+              <a:rPr lang="en-US"/>
               <a:t>Click to edit Master subtitle style</a:t>
             </a:r>
-            <a:endParaRPr lang="en-US"/>
           </a:p>
         </p:txBody>
       </p:sp>
@@ -614,7 +612,7 @@
           <a:p>
             <a:fld id="{20B04DB5-9004-6342-BF4F-AF96194A10D9}" type="datetimeFigureOut">
               <a:rPr lang="en-US" smtClean="0"/>
-              <a:t>9/2/17</a:t>
+              <a:t>4/9/18</a:t>
             </a:fld>
             <a:endParaRPr lang="en-US"/>
           </a:p>
@@ -708,10 +706,9 @@
           <a:lstStyle/>
           <a:p>
             <a:r>
-              <a:rPr lang="en-US" smtClean="0"/>
+              <a:rPr lang="en-US"/>
               <a:t>Click to edit Master title style</a:t>
             </a:r>
-            <a:endParaRPr lang="en-US"/>
           </a:p>
         </p:txBody>
       </p:sp>
@@ -732,38 +729,37 @@
           <a:p>
             <a:pPr lvl="0"/>
             <a:r>
-              <a:rPr lang="en-US" smtClean="0"/>
+              <a:rPr lang="en-US"/>
               <a:t>Click to edit Master text styles</a:t>
             </a:r>
           </a:p>
           <a:p>
             <a:pPr lvl="1"/>
             <a:r>
-              <a:rPr lang="en-US" smtClean="0"/>
+              <a:rPr lang="en-US"/>
               <a:t>Second level</a:t>
             </a:r>
           </a:p>
           <a:p>
             <a:pPr lvl="2"/>
             <a:r>
-              <a:rPr lang="en-US" smtClean="0"/>
+              <a:rPr lang="en-US"/>
               <a:t>Third level</a:t>
             </a:r>
           </a:p>
           <a:p>
             <a:pPr lvl="3"/>
             <a:r>
-              <a:rPr lang="en-US" smtClean="0"/>
+              <a:rPr lang="en-US"/>
               <a:t>Fourth level</a:t>
             </a:r>
           </a:p>
           <a:p>
             <a:pPr lvl="4"/>
             <a:r>
-              <a:rPr lang="en-US" smtClean="0"/>
+              <a:rPr lang="en-US"/>
               <a:t>Fifth level</a:t>
             </a:r>
-            <a:endParaRPr lang="en-US"/>
           </a:p>
         </p:txBody>
       </p:sp>
@@ -784,7 +780,7 @@
           <a:p>
             <a:fld id="{20B04DB5-9004-6342-BF4F-AF96194A10D9}" type="datetimeFigureOut">
               <a:rPr lang="en-US" smtClean="0"/>
-              <a:t>9/2/17</a:t>
+              <a:t>4/9/18</a:t>
             </a:fld>
             <a:endParaRPr lang="en-US"/>
           </a:p>
@@ -883,10 +879,9 @@
           <a:lstStyle/>
           <a:p>
             <a:r>
-              <a:rPr lang="en-US" smtClean="0"/>
+              <a:rPr lang="en-US"/>
               <a:t>Click to edit Master title style</a:t>
             </a:r>
-            <a:endParaRPr lang="en-US"/>
           </a:p>
         </p:txBody>
       </p:sp>
@@ -912,38 +907,37 @@
           <a:p>
             <a:pPr lvl="0"/>
             <a:r>
-              <a:rPr lang="en-US" smtClean="0"/>
+              <a:rPr lang="en-US"/>
               <a:t>Click to edit Master text styles</a:t>
             </a:r>
           </a:p>
           <a:p>
             <a:pPr lvl="1"/>
             <a:r>
-              <a:rPr lang="en-US" smtClean="0"/>
+              <a:rPr lang="en-US"/>
               <a:t>Second level</a:t>
             </a:r>
           </a:p>
           <a:p>
             <a:pPr lvl="2"/>
             <a:r>
-              <a:rPr lang="en-US" smtClean="0"/>
+              <a:rPr lang="en-US"/>
               <a:t>Third level</a:t>
             </a:r>
           </a:p>
           <a:p>
             <a:pPr lvl="3"/>
             <a:r>
-              <a:rPr lang="en-US" smtClean="0"/>
+              <a:rPr lang="en-US"/>
               <a:t>Fourth level</a:t>
             </a:r>
           </a:p>
           <a:p>
             <a:pPr lvl="4"/>
             <a:r>
-              <a:rPr lang="en-US" smtClean="0"/>
+              <a:rPr lang="en-US"/>
               <a:t>Fifth level</a:t>
             </a:r>
-            <a:endParaRPr lang="en-US"/>
           </a:p>
         </p:txBody>
       </p:sp>
@@ -964,7 +958,7 @@
           <a:p>
             <a:fld id="{20B04DB5-9004-6342-BF4F-AF96194A10D9}" type="datetimeFigureOut">
               <a:rPr lang="en-US" smtClean="0"/>
-              <a:t>9/2/17</a:t>
+              <a:t>4/9/18</a:t>
             </a:fld>
             <a:endParaRPr lang="en-US"/>
           </a:p>
@@ -1058,10 +1052,9 @@
           <a:lstStyle/>
           <a:p>
             <a:r>
-              <a:rPr lang="en-US" smtClean="0"/>
+              <a:rPr lang="en-US"/>
               <a:t>Click to edit Master title style</a:t>
             </a:r>
-            <a:endParaRPr lang="en-US"/>
           </a:p>
         </p:txBody>
       </p:sp>
@@ -1082,38 +1075,37 @@
           <a:p>
             <a:pPr lvl="0"/>
             <a:r>
-              <a:rPr lang="en-US" smtClean="0"/>
+              <a:rPr lang="en-US"/>
               <a:t>Click to edit Master text styles</a:t>
             </a:r>
           </a:p>
           <a:p>
             <a:pPr lvl="1"/>
             <a:r>
-              <a:rPr lang="en-US" smtClean="0"/>
+              <a:rPr lang="en-US"/>
               <a:t>Second level</a:t>
             </a:r>
           </a:p>
           <a:p>
             <a:pPr lvl="2"/>
             <a:r>
-              <a:rPr lang="en-US" smtClean="0"/>
+              <a:rPr lang="en-US"/>
               <a:t>Third level</a:t>
             </a:r>
           </a:p>
           <a:p>
             <a:pPr lvl="3"/>
             <a:r>
-              <a:rPr lang="en-US" smtClean="0"/>
+              <a:rPr lang="en-US"/>
               <a:t>Fourth level</a:t>
             </a:r>
           </a:p>
           <a:p>
             <a:pPr lvl="4"/>
             <a:r>
-              <a:rPr lang="en-US" smtClean="0"/>
+              <a:rPr lang="en-US"/>
               <a:t>Fifth level</a:t>
             </a:r>
-            <a:endParaRPr lang="en-US"/>
           </a:p>
         </p:txBody>
       </p:sp>
@@ -1134,7 +1126,7 @@
           <a:p>
             <a:fld id="{20B04DB5-9004-6342-BF4F-AF96194A10D9}" type="datetimeFigureOut">
               <a:rPr lang="en-US" smtClean="0"/>
-              <a:t>9/2/17</a:t>
+              <a:t>4/9/18</a:t>
             </a:fld>
             <a:endParaRPr lang="en-US"/>
           </a:p>
@@ -1237,10 +1229,9 @@
           </a:lstStyle>
           <a:p>
             <a:r>
-              <a:rPr lang="en-US" smtClean="0"/>
+              <a:rPr lang="en-US"/>
               <a:t>Click to edit Master title style</a:t>
             </a:r>
-            <a:endParaRPr lang="en-US"/>
           </a:p>
         </p:txBody>
       </p:sp>
@@ -1357,7 +1348,7 @@
           <a:p>
             <a:pPr lvl="0"/>
             <a:r>
-              <a:rPr lang="en-US" smtClean="0"/>
+              <a:rPr lang="en-US"/>
               <a:t>Click to edit Master text styles</a:t>
             </a:r>
           </a:p>
@@ -1380,7 +1371,7 @@
           <a:p>
             <a:fld id="{20B04DB5-9004-6342-BF4F-AF96194A10D9}" type="datetimeFigureOut">
               <a:rPr lang="en-US" smtClean="0"/>
-              <a:t>9/2/17</a:t>
+              <a:t>4/9/18</a:t>
             </a:fld>
             <a:endParaRPr lang="en-US"/>
           </a:p>
@@ -1474,10 +1465,9 @@
           <a:lstStyle/>
           <a:p>
             <a:r>
-              <a:rPr lang="en-US" smtClean="0"/>
+              <a:rPr lang="en-US"/>
               <a:t>Click to edit Master title style</a:t>
             </a:r>
-            <a:endParaRPr lang="en-US"/>
           </a:p>
         </p:txBody>
       </p:sp>
@@ -1503,38 +1493,37 @@
           <a:p>
             <a:pPr lvl="0"/>
             <a:r>
-              <a:rPr lang="en-US" smtClean="0"/>
+              <a:rPr lang="en-US"/>
               <a:t>Click to edit Master text styles</a:t>
             </a:r>
           </a:p>
           <a:p>
             <a:pPr lvl="1"/>
             <a:r>
-              <a:rPr lang="en-US" smtClean="0"/>
+              <a:rPr lang="en-US"/>
               <a:t>Second level</a:t>
             </a:r>
           </a:p>
           <a:p>
             <a:pPr lvl="2"/>
             <a:r>
-              <a:rPr lang="en-US" smtClean="0"/>
+              <a:rPr lang="en-US"/>
               <a:t>Third level</a:t>
             </a:r>
           </a:p>
           <a:p>
             <a:pPr lvl="3"/>
             <a:r>
-              <a:rPr lang="en-US" smtClean="0"/>
+              <a:rPr lang="en-US"/>
               <a:t>Fourth level</a:t>
             </a:r>
           </a:p>
           <a:p>
             <a:pPr lvl="4"/>
             <a:r>
-              <a:rPr lang="en-US" smtClean="0"/>
+              <a:rPr lang="en-US"/>
               <a:t>Fifth level</a:t>
             </a:r>
-            <a:endParaRPr lang="en-US"/>
           </a:p>
         </p:txBody>
       </p:sp>
@@ -1560,38 +1549,37 @@
           <a:p>
             <a:pPr lvl="0"/>
             <a:r>
-              <a:rPr lang="en-US" smtClean="0"/>
+              <a:rPr lang="en-US"/>
               <a:t>Click to edit Master text styles</a:t>
             </a:r>
           </a:p>
           <a:p>
             <a:pPr lvl="1"/>
             <a:r>
-              <a:rPr lang="en-US" smtClean="0"/>
+              <a:rPr lang="en-US"/>
               <a:t>Second level</a:t>
             </a:r>
           </a:p>
           <a:p>
             <a:pPr lvl="2"/>
             <a:r>
-              <a:rPr lang="en-US" smtClean="0"/>
+              <a:rPr lang="en-US"/>
               <a:t>Third level</a:t>
             </a:r>
           </a:p>
           <a:p>
             <a:pPr lvl="3"/>
             <a:r>
-              <a:rPr lang="en-US" smtClean="0"/>
+              <a:rPr lang="en-US"/>
               <a:t>Fourth level</a:t>
             </a:r>
           </a:p>
           <a:p>
             <a:pPr lvl="4"/>
             <a:r>
-              <a:rPr lang="en-US" smtClean="0"/>
+              <a:rPr lang="en-US"/>
               <a:t>Fifth level</a:t>
             </a:r>
-            <a:endParaRPr lang="en-US"/>
           </a:p>
         </p:txBody>
       </p:sp>
@@ -1612,7 +1600,7 @@
           <a:p>
             <a:fld id="{20B04DB5-9004-6342-BF4F-AF96194A10D9}" type="datetimeFigureOut">
               <a:rPr lang="en-US" smtClean="0"/>
-              <a:t>9/2/17</a:t>
+              <a:t>4/9/18</a:t>
             </a:fld>
             <a:endParaRPr lang="en-US"/>
           </a:p>
@@ -1711,10 +1699,9 @@
           <a:lstStyle/>
           <a:p>
             <a:r>
-              <a:rPr lang="en-US" smtClean="0"/>
+              <a:rPr lang="en-US"/>
               <a:t>Click to edit Master title style</a:t>
             </a:r>
-            <a:endParaRPr lang="en-US"/>
           </a:p>
         </p:txBody>
       </p:sp>
@@ -1777,7 +1764,7 @@
           <a:p>
             <a:pPr lvl="0"/>
             <a:r>
-              <a:rPr lang="en-US" smtClean="0"/>
+              <a:rPr lang="en-US"/>
               <a:t>Click to edit Master text styles</a:t>
             </a:r>
           </a:p>
@@ -1805,38 +1792,37 @@
           <a:p>
             <a:pPr lvl="0"/>
             <a:r>
-              <a:rPr lang="en-US" smtClean="0"/>
+              <a:rPr lang="en-US"/>
               <a:t>Click to edit Master text styles</a:t>
             </a:r>
           </a:p>
           <a:p>
             <a:pPr lvl="1"/>
             <a:r>
-              <a:rPr lang="en-US" smtClean="0"/>
+              <a:rPr lang="en-US"/>
               <a:t>Second level</a:t>
             </a:r>
           </a:p>
           <a:p>
             <a:pPr lvl="2"/>
             <a:r>
-              <a:rPr lang="en-US" smtClean="0"/>
+              <a:rPr lang="en-US"/>
               <a:t>Third level</a:t>
             </a:r>
           </a:p>
           <a:p>
             <a:pPr lvl="3"/>
             <a:r>
-              <a:rPr lang="en-US" smtClean="0"/>
+              <a:rPr lang="en-US"/>
               <a:t>Fourth level</a:t>
             </a:r>
           </a:p>
           <a:p>
             <a:pPr lvl="4"/>
             <a:r>
-              <a:rPr lang="en-US" smtClean="0"/>
+              <a:rPr lang="en-US"/>
               <a:t>Fifth level</a:t>
             </a:r>
-            <a:endParaRPr lang="en-US"/>
           </a:p>
         </p:txBody>
       </p:sp>
@@ -1899,7 +1885,7 @@
           <a:p>
             <a:pPr lvl="0"/>
             <a:r>
-              <a:rPr lang="en-US" smtClean="0"/>
+              <a:rPr lang="en-US"/>
               <a:t>Click to edit Master text styles</a:t>
             </a:r>
           </a:p>
@@ -1927,38 +1913,37 @@
           <a:p>
             <a:pPr lvl="0"/>
             <a:r>
-              <a:rPr lang="en-US" smtClean="0"/>
+              <a:rPr lang="en-US"/>
               <a:t>Click to edit Master text styles</a:t>
             </a:r>
           </a:p>
           <a:p>
             <a:pPr lvl="1"/>
             <a:r>
-              <a:rPr lang="en-US" smtClean="0"/>
+              <a:rPr lang="en-US"/>
               <a:t>Second level</a:t>
             </a:r>
           </a:p>
           <a:p>
             <a:pPr lvl="2"/>
             <a:r>
-              <a:rPr lang="en-US" smtClean="0"/>
+              <a:rPr lang="en-US"/>
               <a:t>Third level</a:t>
             </a:r>
           </a:p>
           <a:p>
             <a:pPr lvl="3"/>
             <a:r>
-              <a:rPr lang="en-US" smtClean="0"/>
+              <a:rPr lang="en-US"/>
               <a:t>Fourth level</a:t>
             </a:r>
           </a:p>
           <a:p>
             <a:pPr lvl="4"/>
             <a:r>
-              <a:rPr lang="en-US" smtClean="0"/>
+              <a:rPr lang="en-US"/>
               <a:t>Fifth level</a:t>
             </a:r>
-            <a:endParaRPr lang="en-US"/>
           </a:p>
         </p:txBody>
       </p:sp>
@@ -1979,7 +1964,7 @@
           <a:p>
             <a:fld id="{20B04DB5-9004-6342-BF4F-AF96194A10D9}" type="datetimeFigureOut">
               <a:rPr lang="en-US" smtClean="0"/>
-              <a:t>9/2/17</a:t>
+              <a:t>4/9/18</a:t>
             </a:fld>
             <a:endParaRPr lang="en-US"/>
           </a:p>
@@ -2073,10 +2058,9 @@
           <a:lstStyle/>
           <a:p>
             <a:r>
-              <a:rPr lang="en-US" smtClean="0"/>
+              <a:rPr lang="en-US"/>
               <a:t>Click to edit Master title style</a:t>
             </a:r>
-            <a:endParaRPr lang="en-US"/>
           </a:p>
         </p:txBody>
       </p:sp>
@@ -2097,7 +2081,7 @@
           <a:p>
             <a:fld id="{20B04DB5-9004-6342-BF4F-AF96194A10D9}" type="datetimeFigureOut">
               <a:rPr lang="en-US" smtClean="0"/>
-              <a:t>9/2/17</a:t>
+              <a:t>4/9/18</a:t>
             </a:fld>
             <a:endParaRPr lang="en-US"/>
           </a:p>
@@ -2192,7 +2176,7 @@
           <a:p>
             <a:fld id="{20B04DB5-9004-6342-BF4F-AF96194A10D9}" type="datetimeFigureOut">
               <a:rPr lang="en-US" smtClean="0"/>
-              <a:t>9/2/17</a:t>
+              <a:t>4/9/18</a:t>
             </a:fld>
             <a:endParaRPr lang="en-US"/>
           </a:p>
@@ -2295,10 +2279,9 @@
           </a:lstStyle>
           <a:p>
             <a:r>
-              <a:rPr lang="en-US" smtClean="0"/>
+              <a:rPr lang="en-US"/>
               <a:t>Click to edit Master title style</a:t>
             </a:r>
-            <a:endParaRPr lang="en-US"/>
           </a:p>
         </p:txBody>
       </p:sp>
@@ -2352,38 +2335,37 @@
           <a:p>
             <a:pPr lvl="0"/>
             <a:r>
-              <a:rPr lang="en-US" smtClean="0"/>
+              <a:rPr lang="en-US"/>
               <a:t>Click to edit Master text styles</a:t>
             </a:r>
           </a:p>
           <a:p>
             <a:pPr lvl="1"/>
             <a:r>
-              <a:rPr lang="en-US" smtClean="0"/>
+              <a:rPr lang="en-US"/>
               <a:t>Second level</a:t>
             </a:r>
           </a:p>
           <a:p>
             <a:pPr lvl="2"/>
             <a:r>
-              <a:rPr lang="en-US" smtClean="0"/>
+              <a:rPr lang="en-US"/>
               <a:t>Third level</a:t>
             </a:r>
           </a:p>
           <a:p>
             <a:pPr lvl="3"/>
             <a:r>
-              <a:rPr lang="en-US" smtClean="0"/>
+              <a:rPr lang="en-US"/>
               <a:t>Fourth level</a:t>
             </a:r>
           </a:p>
           <a:p>
             <a:pPr lvl="4"/>
             <a:r>
-              <a:rPr lang="en-US" smtClean="0"/>
+              <a:rPr lang="en-US"/>
               <a:t>Fifth level</a:t>
             </a:r>
-            <a:endParaRPr lang="en-US"/>
           </a:p>
         </p:txBody>
       </p:sp>
@@ -2446,7 +2428,7 @@
           <a:p>
             <a:pPr lvl="0"/>
             <a:r>
-              <a:rPr lang="en-US" smtClean="0"/>
+              <a:rPr lang="en-US"/>
               <a:t>Click to edit Master text styles</a:t>
             </a:r>
           </a:p>
@@ -2469,7 +2451,7 @@
           <a:p>
             <a:fld id="{20B04DB5-9004-6342-BF4F-AF96194A10D9}" type="datetimeFigureOut">
               <a:rPr lang="en-US" smtClean="0"/>
-              <a:t>9/2/17</a:t>
+              <a:t>4/9/18</a:t>
             </a:fld>
             <a:endParaRPr lang="en-US"/>
           </a:p>
@@ -2572,10 +2554,9 @@
           </a:lstStyle>
           <a:p>
             <a:r>
-              <a:rPr lang="en-US" smtClean="0"/>
+              <a:rPr lang="en-US"/>
               <a:t>Click to edit Master title style</a:t>
             </a:r>
-            <a:endParaRPr lang="en-US"/>
           </a:p>
         </p:txBody>
       </p:sp>
@@ -2699,7 +2680,7 @@
           <a:p>
             <a:pPr lvl="0"/>
             <a:r>
-              <a:rPr lang="en-US" smtClean="0"/>
+              <a:rPr lang="en-US"/>
               <a:t>Click to edit Master text styles</a:t>
             </a:r>
           </a:p>
@@ -2722,7 +2703,7 @@
           <a:p>
             <a:fld id="{20B04DB5-9004-6342-BF4F-AF96194A10D9}" type="datetimeFigureOut">
               <a:rPr lang="en-US" smtClean="0"/>
-              <a:t>9/2/17</a:t>
+              <a:t>4/9/18</a:t>
             </a:fld>
             <a:endParaRPr lang="en-US"/>
           </a:p>
@@ -2831,10 +2812,9 @@
           <a:lstStyle/>
           <a:p>
             <a:r>
-              <a:rPr lang="en-US" smtClean="0"/>
+              <a:rPr lang="en-US"/>
               <a:t>Click to edit Master title style</a:t>
             </a:r>
-            <a:endParaRPr lang="en-US"/>
           </a:p>
         </p:txBody>
       </p:sp>
@@ -2865,38 +2845,37 @@
           <a:p>
             <a:pPr lvl="0"/>
             <a:r>
-              <a:rPr lang="en-US" smtClean="0"/>
+              <a:rPr lang="en-US"/>
               <a:t>Click to edit Master text styles</a:t>
             </a:r>
           </a:p>
           <a:p>
             <a:pPr lvl="1"/>
             <a:r>
-              <a:rPr lang="en-US" smtClean="0"/>
+              <a:rPr lang="en-US"/>
               <a:t>Second level</a:t>
             </a:r>
           </a:p>
           <a:p>
             <a:pPr lvl="2"/>
             <a:r>
-              <a:rPr lang="en-US" smtClean="0"/>
+              <a:rPr lang="en-US"/>
               <a:t>Third level</a:t>
             </a:r>
           </a:p>
           <a:p>
             <a:pPr lvl="3"/>
             <a:r>
-              <a:rPr lang="en-US" smtClean="0"/>
+              <a:rPr lang="en-US"/>
               <a:t>Fourth level</a:t>
             </a:r>
           </a:p>
           <a:p>
             <a:pPr lvl="4"/>
             <a:r>
-              <a:rPr lang="en-US" smtClean="0"/>
+              <a:rPr lang="en-US"/>
               <a:t>Fifth level</a:t>
             </a:r>
-            <a:endParaRPr lang="en-US"/>
           </a:p>
         </p:txBody>
       </p:sp>
@@ -2935,7 +2914,7 @@
           <a:p>
             <a:fld id="{20B04DB5-9004-6342-BF4F-AF96194A10D9}" type="datetimeFigureOut">
               <a:rPr lang="en-US" smtClean="0"/>
-              <a:t>9/2/17</a:t>
+              <a:t>4/9/18</a:t>
             </a:fld>
             <a:endParaRPr lang="en-US"/>
           </a:p>
@@ -3474,23 +3453,7 @@
                 <a:ea typeface="Calibri" charset="0"/>
                 <a:cs typeface="Calibri" charset="0"/>
               </a:rPr>
-              <a:t>No </a:t>
-            </a:r>
-            <a:r>
-              <a:rPr lang="en-AU" sz="800" smtClean="0">
-                <a:effectLst/>
-                <a:ea typeface="Calibri" charset="0"/>
-                <a:cs typeface="Calibri" charset="0"/>
-              </a:rPr>
-              <a:t>amoxicillin </a:t>
-            </a:r>
-            <a:r>
-              <a:rPr lang="en-AU" sz="800">
-                <a:effectLst/>
-                <a:ea typeface="Calibri" charset="0"/>
-                <a:cs typeface="Calibri" charset="0"/>
-              </a:rPr>
-              <a:t>allergy</a:t>
+              <a:t>No amoxicillin allergy</a:t>
             </a:r>
             <a:endParaRPr lang="en-GB" sz="1200">
               <a:effectLst/>
@@ -3560,7 +3523,7 @@
               <a:t>Not allergic to </a:t>
             </a:r>
             <a:r>
-              <a:rPr lang="en-AU" sz="800" err="1" smtClean="0">
+              <a:rPr lang="en-AU" sz="800" err="1">
                 <a:effectLst/>
                 <a:ea typeface="Calibri" charset="0"/>
                 <a:cs typeface="Calibri" charset="0"/>
@@ -3637,15 +3600,7 @@
                 <a:ea typeface="Calibri" charset="0"/>
                 <a:cs typeface="Calibri" charset="0"/>
               </a:rPr>
-              <a:t>No penicillin </a:t>
-            </a:r>
-            <a:r>
-              <a:rPr lang="en-AU" sz="800" smtClean="0">
-                <a:effectLst/>
-                <a:ea typeface="Calibri" charset="0"/>
-                <a:cs typeface="Calibri" charset="0"/>
-              </a:rPr>
-              <a:t>allergy</a:t>
+              <a:t>No penicillin allergy</a:t>
             </a:r>
             <a:r>
               <a:rPr lang="en-AU" sz="1200">
@@ -3859,15 +3814,7 @@
                 <a:ea typeface="Calibri" charset="0"/>
                 <a:cs typeface="Calibri" charset="0"/>
               </a:rPr>
-              <a:t>Is allergic to </a:t>
-            </a:r>
-            <a:r>
-              <a:rPr lang="en-AU" sz="800" smtClean="0">
-                <a:effectLst/>
-                <a:ea typeface="Calibri" charset="0"/>
-                <a:cs typeface="Calibri" charset="0"/>
-              </a:rPr>
-              <a:t>penicillin</a:t>
+              <a:t>Is allergic to penicillin</a:t>
             </a:r>
             <a:endParaRPr lang="en-GB" sz="1200">
               <a:effectLst/>
@@ -5664,10 +5611,9 @@
           <a:lstStyle/>
           <a:p>
             <a:r>
-              <a:rPr lang="en-US" smtClean="0"/>
+              <a:rPr lang="en-US"/>
               <a:t>Figure AppB1: An extension of Figure 6 from Section 5.2 showing Process classes and Questions</a:t>
             </a:r>
-            <a:endParaRPr lang="en-US"/>
           </a:p>
         </p:txBody>
       </p:sp>
@@ -5723,7 +5669,7 @@
               </a:spcAft>
             </a:pPr>
             <a:r>
-              <a:rPr lang="en-AU" sz="800" smtClean="0">
+              <a:rPr lang="en-AU" sz="800">
                 <a:effectLst/>
                 <a:ea typeface="Calibri" charset="0"/>
                 <a:cs typeface="Calibri" charset="0"/>
@@ -5731,7 +5677,7 @@
               <a:t>Rec for deciding about</a:t>
             </a:r>
             <a:r>
-              <a:rPr lang="mr-IN" sz="800" smtClean="0">
+              <a:rPr lang="mr-IN" sz="800">
                 <a:effectLst/>
                 <a:ea typeface="Calibri" charset="0"/>
                 <a:cs typeface="Calibri" charset="0"/>
@@ -5868,7 +5814,7 @@
               <a:t>i</a:t>
             </a:r>
             <a:r>
-              <a:rPr lang="en-AU" sz="800" smtClean="0">
+              <a:rPr lang="en-AU" sz="800">
                 <a:effectLst/>
                 <a:latin typeface="Calibri" charset="0"/>
                 <a:ea typeface="Calibri" charset="0"/>
@@ -5924,14 +5870,7 @@
                 <a:latin typeface="Calibri" charset="0"/>
                 <a:ea typeface="Calibri" charset="0"/>
               </a:rPr>
-              <a:t>s</a:t>
-            </a:r>
-            <a:r>
-              <a:rPr lang="en-AU" sz="800" err="1" smtClean="0">
-                <a:latin typeface="Calibri" charset="0"/>
-                <a:ea typeface="Calibri" charset="0"/>
-              </a:rPr>
-              <a:t>atisfies_recommendation</a:t>
+              <a:t>satisfies_recommendation</a:t>
             </a:r>
             <a:endParaRPr lang="en-GB" sz="1200">
               <a:effectLst/>
@@ -5993,7 +5932,7 @@
               </a:spcAft>
             </a:pPr>
             <a:r>
-              <a:rPr lang="en-AU" sz="800" smtClean="0">
+              <a:rPr lang="en-AU" sz="800">
                 <a:effectLst/>
                 <a:ea typeface="Calibri" charset="0"/>
                 <a:cs typeface="Calibri" charset="0"/>
@@ -6191,7 +6130,7 @@
               </a:spcAft>
             </a:pPr>
             <a:r>
-              <a:rPr lang="en-AU" sz="800" smtClean="0">
+              <a:rPr lang="en-AU" sz="800">
                 <a:effectLst/>
                 <a:ea typeface="Calibri" charset="0"/>
                 <a:cs typeface="Calibri" charset="0"/>
@@ -6268,7 +6207,7 @@
               </a:spcAft>
             </a:pPr>
             <a:r>
-              <a:rPr lang="en-AU" sz="800" smtClean="0">
+              <a:rPr lang="en-AU" sz="800">
                 <a:effectLst/>
                 <a:ea typeface="Calibri" charset="0"/>
                 <a:cs typeface="Calibri" charset="0"/>
@@ -6345,7 +6284,7 @@
               </a:spcAft>
             </a:pPr>
             <a:r>
-              <a:rPr lang="en-AU" sz="800" smtClean="0">
+              <a:rPr lang="en-AU" sz="800">
                 <a:effectLst/>
                 <a:ea typeface="Calibri" charset="0"/>
                 <a:cs typeface="Calibri" charset="0"/>
@@ -6594,7 +6533,7 @@
               </a:spcAft>
             </a:pPr>
             <a:r>
-              <a:rPr lang="en-AU" sz="800" smtClean="0">
+              <a:rPr lang="en-AU" sz="800">
                 <a:latin typeface="Calibri" charset="0"/>
                 <a:ea typeface="Calibri" charset="0"/>
               </a:rPr>
@@ -6670,7 +6609,7 @@
               </a:spcAft>
             </a:pPr>
             <a:r>
-              <a:rPr lang="en-AU" sz="800" smtClean="0">
+              <a:rPr lang="en-AU" sz="800">
                 <a:effectLst/>
                 <a:ea typeface="Calibri" charset="0"/>
                 <a:cs typeface="Calibri" charset="0"/>
@@ -6747,7 +6686,7 @@
               </a:spcAft>
             </a:pPr>
             <a:r>
-              <a:rPr lang="en-AU" sz="800" smtClean="0">
+              <a:rPr lang="en-AU" sz="800">
                 <a:effectLst/>
                 <a:ea typeface="Calibri" charset="0"/>
                 <a:cs typeface="Calibri" charset="0"/>
@@ -6922,14 +6861,7 @@
                 <a:latin typeface="Calibri" charset="0"/>
                 <a:ea typeface="Calibri" charset="0"/>
               </a:rPr>
-              <a:t>i</a:t>
-            </a:r>
-            <a:r>
-              <a:rPr lang="en-AU" sz="800" err="1" smtClean="0">
-                <a:latin typeface="Calibri" charset="0"/>
-                <a:ea typeface="Calibri" charset="0"/>
-              </a:rPr>
-              <a:t>s_consideration_of</a:t>
+              <a:t>is_consideration_of</a:t>
             </a:r>
             <a:endParaRPr lang="en-GB" sz="1200">
               <a:effectLst/>
@@ -7001,7 +6933,7 @@
               </a:spcAft>
             </a:pPr>
             <a:r>
-              <a:rPr lang="en-AU" sz="800" smtClean="0">
+              <a:rPr lang="en-AU" sz="800">
                 <a:effectLst/>
                 <a:ea typeface="Calibri" charset="0"/>
                 <a:cs typeface="Calibri" charset="0"/>
@@ -7009,7 +6941,7 @@
               <a:t>Question for indicating</a:t>
             </a:r>
             <a:r>
-              <a:rPr lang="mr-IN" sz="800" smtClean="0">
+              <a:rPr lang="mr-IN" sz="800">
                 <a:effectLst/>
                 <a:ea typeface="Calibri" charset="0"/>
                 <a:cs typeface="Calibri" charset="0"/>
@@ -7086,7 +7018,7 @@
               </a:spcAft>
             </a:pPr>
             <a:r>
-              <a:rPr lang="en-AU" sz="800" smtClean="0">
+              <a:rPr lang="en-AU" sz="800">
                 <a:effectLst/>
                 <a:ea typeface="Calibri" charset="0"/>
                 <a:cs typeface="Calibri" charset="0"/>
@@ -7163,7 +7095,7 @@
               </a:spcAft>
             </a:pPr>
             <a:r>
-              <a:rPr lang="en-AU" sz="800" smtClean="0">
+              <a:rPr lang="en-AU" sz="800">
                 <a:effectLst/>
                 <a:ea typeface="Calibri" charset="0"/>
                 <a:cs typeface="Calibri" charset="0"/>
@@ -7240,7 +7172,7 @@
               </a:spcAft>
             </a:pPr>
             <a:r>
-              <a:rPr lang="en-AU" sz="800" err="1" smtClean="0">
+              <a:rPr lang="en-AU" sz="800" err="1">
                 <a:effectLst/>
                 <a:ea typeface="Calibri" charset="0"/>
                 <a:cs typeface="Calibri" charset="0"/>
@@ -7317,7 +7249,7 @@
               </a:spcAft>
             </a:pPr>
             <a:r>
-              <a:rPr lang="en-AU" sz="800" smtClean="0">
+              <a:rPr lang="en-AU" sz="800">
                 <a:effectLst/>
                 <a:ea typeface="Calibri" charset="0"/>
                 <a:cs typeface="Calibri" charset="0"/>
@@ -7325,7 +7257,7 @@
               <a:t>Deciding about</a:t>
             </a:r>
             <a:r>
-              <a:rPr lang="mr-IN" sz="800" smtClean="0">
+              <a:rPr lang="mr-IN" sz="800">
                 <a:effectLst/>
                 <a:ea typeface="Calibri" charset="0"/>
                 <a:cs typeface="Calibri" charset="0"/>
@@ -7402,7 +7334,7 @@
               </a:spcAft>
             </a:pPr>
             <a:r>
-              <a:rPr lang="en-AU" sz="800" smtClean="0">
+              <a:rPr lang="en-AU" sz="800">
                 <a:effectLst/>
                 <a:ea typeface="Calibri" charset="0"/>
                 <a:cs typeface="Calibri" charset="0"/>
@@ -7410,7 +7342,7 @@
               <a:t>Deciding about</a:t>
             </a:r>
             <a:r>
-              <a:rPr lang="mr-IN" sz="800" smtClean="0">
+              <a:rPr lang="mr-IN" sz="800">
                 <a:effectLst/>
                 <a:ea typeface="Calibri" charset="0"/>
                 <a:cs typeface="Calibri" charset="0"/>
@@ -7539,7 +7471,7 @@
               </a:spcAft>
             </a:pPr>
             <a:r>
-              <a:rPr lang="en-AU" sz="800" smtClean="0">
+              <a:rPr lang="en-AU" sz="800">
                 <a:latin typeface="Calibri" charset="0"/>
                 <a:ea typeface="Calibri" charset="0"/>
               </a:rPr>
@@ -9676,7 +9608,7 @@
           <a:p>
             <a:pPr algn="ctr"/>
             <a:r>
-              <a:rPr lang="en-US" sz="1000" err="1" smtClean="0">
+              <a:rPr lang="en-US" sz="1000" err="1">
                 <a:solidFill>
                   <a:schemeClr val="tx1"/>
                 </a:solidFill>
@@ -10008,7 +9940,7 @@
           <a:p>
             <a:pPr algn="ctr"/>
             <a:r>
-              <a:rPr lang="en-US" sz="1000" err="1" smtClean="0">
+              <a:rPr lang="en-US" sz="1000" err="1">
                 <a:solidFill>
                   <a:schemeClr val="tx1"/>
                 </a:solidFill>
@@ -10070,7 +10002,7 @@
           <a:p>
             <a:pPr algn="ctr"/>
             <a:r>
-              <a:rPr lang="en-US" sz="1000" err="1" smtClean="0">
+              <a:rPr lang="en-US" sz="1000" err="1">
                 <a:solidFill>
                   <a:schemeClr val="tx1"/>
                 </a:solidFill>
@@ -10132,7 +10064,7 @@
           <a:p>
             <a:pPr algn="ctr"/>
             <a:r>
-              <a:rPr lang="en-US" sz="1000" err="1" smtClean="0">
+              <a:rPr lang="en-US" sz="1000" err="1">
                 <a:solidFill>
                   <a:schemeClr val="tx1"/>
                 </a:solidFill>
@@ -10194,7 +10126,7 @@
           <a:p>
             <a:pPr algn="ctr"/>
             <a:r>
-              <a:rPr lang="en-US" sz="1000" err="1" smtClean="0">
+              <a:rPr lang="en-US" sz="1000" err="1">
                 <a:solidFill>
                   <a:schemeClr val="tx1"/>
                 </a:solidFill>
@@ -10318,7 +10250,7 @@
           <a:p>
             <a:pPr algn="ctr"/>
             <a:r>
-              <a:rPr lang="en-US" sz="1000" err="1" smtClean="0">
+              <a:rPr lang="en-US" sz="1000" err="1">
                 <a:solidFill>
                   <a:schemeClr val="tx1"/>
                 </a:solidFill>
@@ -10380,7 +10312,7 @@
           <a:p>
             <a:pPr algn="ctr"/>
             <a:r>
-              <a:rPr lang="en-US" sz="1000" err="1" smtClean="0">
+              <a:rPr lang="en-US" sz="1000" err="1">
                 <a:solidFill>
                   <a:schemeClr val="tx1"/>
                 </a:solidFill>
@@ -10840,7 +10772,7 @@
           <a:p>
             <a:pPr algn="ctr"/>
             <a:r>
-              <a:rPr lang="en-US" sz="1000" err="1" smtClean="0">
+              <a:rPr lang="en-US" sz="1000" err="1">
                 <a:solidFill>
                   <a:schemeClr val="tx1"/>
                 </a:solidFill>
@@ -12024,7 +11956,7 @@
           <a:p>
             <a:pPr algn="ctr"/>
             <a:r>
-              <a:rPr lang="en-US" sz="1000" err="1" smtClean="0">
+              <a:rPr lang="en-US" sz="1000" err="1">
                 <a:solidFill>
                   <a:schemeClr val="tx1"/>
                 </a:solidFill>
@@ -12148,7 +12080,7 @@
           <a:p>
             <a:pPr algn="ctr"/>
             <a:r>
-              <a:rPr lang="en-US" sz="1000" err="1" smtClean="0">
+              <a:rPr lang="en-US" sz="1000" err="1">
                 <a:solidFill>
                   <a:schemeClr val="tx1"/>
                 </a:solidFill>
@@ -12210,7 +12142,7 @@
           <a:p>
             <a:pPr algn="ctr"/>
             <a:r>
-              <a:rPr lang="en-US" sz="1000" err="1" smtClean="0">
+              <a:rPr lang="en-US" sz="1000" err="1">
                 <a:solidFill>
                   <a:schemeClr val="tx1"/>
                 </a:solidFill>
@@ -12845,7 +12777,7 @@
               </a:spcAft>
             </a:pPr>
             <a:r>
-              <a:rPr lang="en-AU" sz="1000" smtClean="0">
+              <a:rPr lang="en-AU" sz="1000">
                 <a:solidFill>
                   <a:srgbClr val="00B050"/>
                 </a:solidFill>
@@ -13097,7 +13029,7 @@
           <a:p>
             <a:pPr algn="ctr"/>
             <a:r>
-              <a:rPr lang="en-US" sz="1000" err="1" smtClean="0">
+              <a:rPr lang="en-US" sz="1000" err="1">
                 <a:solidFill>
                   <a:schemeClr val="tx1"/>
                 </a:solidFill>
@@ -13221,7 +13153,7 @@
           <a:p>
             <a:pPr algn="ctr"/>
             <a:r>
-              <a:rPr lang="en-US" sz="1000" err="1" smtClean="0">
+              <a:rPr lang="en-US" sz="1000" err="1">
                 <a:solidFill>
                   <a:schemeClr val="tx1"/>
                 </a:solidFill>
@@ -13283,7 +13215,7 @@
           <a:p>
             <a:pPr algn="ctr"/>
             <a:r>
-              <a:rPr lang="en-US" sz="1000" err="1" smtClean="0">
+              <a:rPr lang="en-US" sz="1000" err="1">
                 <a:solidFill>
                   <a:schemeClr val="tx1"/>
                 </a:solidFill>
@@ -14050,7 +13982,7 @@
           <a:p>
             <a:pPr algn="ctr"/>
             <a:r>
-              <a:rPr lang="en-US" sz="1000" err="1" smtClean="0">
+              <a:rPr lang="en-US" sz="1000" err="1">
                 <a:solidFill>
                   <a:schemeClr val="tx1"/>
                 </a:solidFill>
@@ -14142,7 +14074,7 @@
           <a:p>
             <a:pPr algn="ctr"/>
             <a:r>
-              <a:rPr lang="en-US" sz="1000" err="1" smtClean="0">
+              <a:rPr lang="en-US" sz="1000" err="1">
                 <a:solidFill>
                   <a:schemeClr val="tx1"/>
                 </a:solidFill>
@@ -14266,7 +14198,7 @@
           <a:p>
             <a:pPr algn="ctr"/>
             <a:r>
-              <a:rPr lang="en-US" sz="1000" err="1" smtClean="0">
+              <a:rPr lang="en-US" sz="1000" err="1">
                 <a:solidFill>
                   <a:schemeClr val="tx1"/>
                 </a:solidFill>
@@ -14328,7 +14260,7 @@
           <a:p>
             <a:pPr algn="ctr"/>
             <a:r>
-              <a:rPr lang="en-US" sz="1000" err="1" smtClean="0">
+              <a:rPr lang="en-US" sz="1000" err="1">
                 <a:solidFill>
                   <a:schemeClr val="tx1"/>
                 </a:solidFill>
@@ -14936,7 +14868,7 @@
           <a:p>
             <a:pPr algn="ctr"/>
             <a:r>
-              <a:rPr lang="en-US" sz="1000" err="1" smtClean="0">
+              <a:rPr lang="en-US" sz="1000" err="1">
                 <a:solidFill>
                   <a:schemeClr val="tx1"/>
                 </a:solidFill>
@@ -15060,7 +14992,7 @@
           <a:p>
             <a:pPr algn="ctr"/>
             <a:r>
-              <a:rPr lang="en-US" sz="1000" err="1" smtClean="0">
+              <a:rPr lang="en-US" sz="1000" err="1">
                 <a:solidFill>
                   <a:schemeClr val="tx1"/>
                 </a:solidFill>
@@ -15122,7 +15054,7 @@
           <a:p>
             <a:pPr algn="ctr"/>
             <a:r>
-              <a:rPr lang="en-US" sz="1000" err="1" smtClean="0">
+              <a:rPr lang="en-US" sz="1000" err="1">
                 <a:solidFill>
                   <a:schemeClr val="tx1"/>
                 </a:solidFill>
@@ -15848,7 +15780,7 @@
           <a:p>
             <a:pPr algn="ctr"/>
             <a:r>
-              <a:rPr lang="en-US" sz="1000" err="1" smtClean="0">
+              <a:rPr lang="en-US" sz="1000" err="1">
                 <a:solidFill>
                   <a:schemeClr val="tx1"/>
                 </a:solidFill>
@@ -15910,7 +15842,7 @@
           <a:p>
             <a:pPr algn="ctr"/>
             <a:r>
-              <a:rPr lang="en-US" sz="1000" err="1" smtClean="0">
+              <a:rPr lang="en-US" sz="1000" err="1">
                 <a:solidFill>
                   <a:schemeClr val="tx1"/>
                 </a:solidFill>
@@ -16141,7 +16073,7 @@
           <a:p>
             <a:pPr algn="ctr"/>
             <a:r>
-              <a:rPr lang="en-US" sz="1000" err="1" smtClean="0">
+              <a:rPr lang="en-US" sz="1000" err="1">
                 <a:solidFill>
                   <a:schemeClr val="tx1"/>
                 </a:solidFill>
@@ -16265,7 +16197,7 @@
           <a:p>
             <a:pPr algn="ctr"/>
             <a:r>
-              <a:rPr lang="en-US" sz="1000" err="1" smtClean="0">
+              <a:rPr lang="en-US" sz="1000" err="1">
                 <a:solidFill>
                   <a:schemeClr val="tx1"/>
                 </a:solidFill>
@@ -16327,7 +16259,7 @@
           <a:p>
             <a:pPr algn="ctr"/>
             <a:r>
-              <a:rPr lang="en-US" sz="1000" err="1" smtClean="0">
+              <a:rPr lang="en-US" sz="1000" err="1">
                 <a:solidFill>
                   <a:schemeClr val="tx1"/>
                 </a:solidFill>
@@ -17050,7 +16982,7 @@
           <a:p>
             <a:pPr algn="ctr"/>
             <a:r>
-              <a:rPr lang="en-US" sz="1000" err="1" smtClean="0">
+              <a:rPr lang="en-US" sz="1000" err="1">
                 <a:solidFill>
                   <a:schemeClr val="tx1"/>
                 </a:solidFill>
@@ -17112,7 +17044,7 @@
           <a:p>
             <a:pPr algn="ctr"/>
             <a:r>
-              <a:rPr lang="en-US" sz="1000" err="1" smtClean="0">
+              <a:rPr lang="en-US" sz="1000" err="1">
                 <a:solidFill>
                   <a:schemeClr val="tx1"/>
                 </a:solidFill>
@@ -17307,7 +17239,7 @@
           <a:p>
             <a:pPr algn="ctr"/>
             <a:r>
-              <a:rPr lang="en-US" sz="1000" err="1" smtClean="0">
+              <a:rPr lang="en-US" sz="1000" err="1">
                 <a:solidFill>
                   <a:schemeClr val="tx1"/>
                 </a:solidFill>
@@ -17408,7 +17340,7 @@
           <a:p>
             <a:pPr algn="ctr"/>
             <a:r>
-              <a:rPr lang="en-US" sz="1000" err="1" smtClean="0">
+              <a:rPr lang="en-US" sz="1000" err="1">
                 <a:solidFill>
                   <a:schemeClr val="tx1"/>
                 </a:solidFill>
@@ -17468,7 +17400,7 @@
           <a:p>
             <a:pPr algn="ctr"/>
             <a:r>
-              <a:rPr lang="en-US" sz="1000" err="1" smtClean="0">
+              <a:rPr lang="en-US" sz="1000" err="1">
                 <a:solidFill>
                   <a:schemeClr val="tx1"/>
                 </a:solidFill>
@@ -17611,15 +17543,7 @@
                   <a:schemeClr val="tx1"/>
                 </a:solidFill>
               </a:rPr>
-              <a:t>Re</a:t>
-            </a:r>
-            <a:r>
-              <a:rPr lang="en-US" sz="1000" err="1" smtClean="0">
-                <a:solidFill>
-                  <a:schemeClr val="tx1"/>
-                </a:solidFill>
-              </a:rPr>
-              <a:t>quirement P</a:t>
+              <a:t>Requirement P</a:t>
             </a:r>
             <a:endParaRPr lang="en-US" sz="1000">
               <a:solidFill>
@@ -17679,15 +17603,7 @@
                   <a:schemeClr val="tx1"/>
                 </a:solidFill>
               </a:rPr>
-              <a:t>Re</a:t>
-            </a:r>
-            <a:r>
-              <a:rPr lang="en-US" sz="1000" err="1" smtClean="0">
-                <a:solidFill>
-                  <a:schemeClr val="tx1"/>
-                </a:solidFill>
-              </a:rPr>
-              <a:t>quirement Q</a:t>
+              <a:t>Requirement Q</a:t>
             </a:r>
             <a:endParaRPr lang="en-US" sz="1000">
               <a:solidFill>
@@ -18236,7 +18152,7 @@
           <a:p>
             <a:pPr algn="ctr"/>
             <a:r>
-              <a:rPr lang="en-US" sz="1000" err="1" smtClean="0">
+              <a:rPr lang="en-US" sz="1000" err="1">
                 <a:solidFill>
                   <a:schemeClr val="tx1"/>
                 </a:solidFill>
@@ -19326,7 +19242,7 @@
               </a:spcAft>
             </a:pPr>
             <a:r>
-              <a:rPr lang="en-AU" sz="1000" smtClean="0">
+              <a:rPr lang="en-AU" sz="1000">
                 <a:solidFill>
                   <a:srgbClr val="00B050"/>
                 </a:solidFill>
@@ -19516,7 +19432,7 @@
               </a:spcAft>
             </a:pPr>
             <a:r>
-              <a:rPr lang="en-AU" sz="1000" smtClean="0">
+              <a:rPr lang="en-AU" sz="1000">
                 <a:solidFill>
                   <a:srgbClr val="00B050"/>
                 </a:solidFill>
@@ -19640,7 +19556,7 @@
           <a:p>
             <a:pPr algn="ctr"/>
             <a:r>
-              <a:rPr lang="en-US" sz="1000" err="1" smtClean="0">
+              <a:rPr lang="en-US" sz="1000" err="1">
                 <a:solidFill>
                   <a:schemeClr val="tx1"/>
                 </a:solidFill>
@@ -19764,7 +19680,7 @@
           <a:p>
             <a:pPr algn="ctr"/>
             <a:r>
-              <a:rPr lang="en-US" sz="1000" err="1" smtClean="0">
+              <a:rPr lang="en-US" sz="1000" err="1">
                 <a:solidFill>
                   <a:schemeClr val="tx1"/>
                 </a:solidFill>
@@ -20444,7 +20360,7 @@
               </a:spcAft>
             </a:pPr>
             <a:r>
-              <a:rPr lang="en-AU" sz="1000" smtClean="0">
+              <a:rPr lang="en-AU" sz="1000">
                 <a:solidFill>
                   <a:srgbClr val="00B050"/>
                 </a:solidFill>
@@ -20566,7 +20482,7 @@
           <a:p>
             <a:pPr algn="ctr"/>
             <a:r>
-              <a:rPr lang="en-US" sz="1000" err="1" smtClean="0">
+              <a:rPr lang="en-US" sz="1000" err="1">
                 <a:solidFill>
                   <a:schemeClr val="tx1"/>
                 </a:solidFill>
@@ -20626,7 +20542,7 @@
           <a:p>
             <a:pPr algn="ctr"/>
             <a:r>
-              <a:rPr lang="en-US" sz="1000" err="1" smtClean="0">
+              <a:rPr lang="en-US" sz="1000" err="1">
                 <a:solidFill>
                   <a:schemeClr val="tx1"/>
                 </a:solidFill>
@@ -20691,15 +20607,7 @@
                   <a:schemeClr val="tx1"/>
                 </a:solidFill>
               </a:rPr>
-              <a:t>Re</a:t>
-            </a:r>
-            <a:r>
-              <a:rPr lang="en-US" sz="1000" err="1" smtClean="0">
-                <a:solidFill>
-                  <a:schemeClr val="tx1"/>
-                </a:solidFill>
-              </a:rPr>
-              <a:t>quirement W</a:t>
+              <a:t>Requirement W</a:t>
             </a:r>
             <a:endParaRPr lang="en-US" sz="1000">
               <a:solidFill>
@@ -20759,15 +20667,7 @@
                   <a:schemeClr val="tx1"/>
                 </a:solidFill>
               </a:rPr>
-              <a:t>Re</a:t>
-            </a:r>
-            <a:r>
-              <a:rPr lang="en-US" sz="1000" err="1" smtClean="0">
-                <a:solidFill>
-                  <a:schemeClr val="tx1"/>
-                </a:solidFill>
-              </a:rPr>
-              <a:t>quirement X</a:t>
+              <a:t>Requirement X</a:t>
             </a:r>
             <a:endParaRPr lang="en-US" sz="1000">
               <a:solidFill>
@@ -20827,15 +20727,7 @@
                   <a:schemeClr val="tx1"/>
                 </a:solidFill>
               </a:rPr>
-              <a:t>Re</a:t>
-            </a:r>
-            <a:r>
-              <a:rPr lang="en-US" sz="1000" err="1" smtClean="0">
-                <a:solidFill>
-                  <a:schemeClr val="tx1"/>
-                </a:solidFill>
-              </a:rPr>
-              <a:t>quirement Y</a:t>
+              <a:t>Requirement Y</a:t>
             </a:r>
             <a:endParaRPr lang="en-US" sz="1000">
               <a:solidFill>
@@ -20890,7 +20782,7 @@
           <a:p>
             <a:pPr algn="ctr"/>
             <a:r>
-              <a:rPr lang="en-US" sz="1000" err="1" smtClean="0">
+              <a:rPr lang="en-US" sz="1000" err="1">
                 <a:solidFill>
                   <a:schemeClr val="tx1"/>
                 </a:solidFill>
@@ -20982,7 +20874,7 @@
           <a:p>
             <a:pPr algn="ctr"/>
             <a:r>
-              <a:rPr lang="en-US" sz="1000" err="1" smtClean="0">
+              <a:rPr lang="en-US" sz="1000" err="1">
                 <a:solidFill>
                   <a:schemeClr val="tx1"/>
                 </a:solidFill>
@@ -21044,7 +20936,7 @@
           <a:p>
             <a:pPr algn="ctr"/>
             <a:r>
-              <a:rPr lang="en-US" sz="1000" err="1" smtClean="0">
+              <a:rPr lang="en-US" sz="1000" err="1">
                 <a:solidFill>
                   <a:schemeClr val="tx1"/>
                 </a:solidFill>
@@ -21552,7 +21444,7 @@
           <a:p>
             <a:pPr algn="ctr"/>
             <a:r>
-              <a:rPr lang="en-US" sz="1000" err="1" smtClean="0">
+              <a:rPr lang="en-US" sz="1000" err="1">
                 <a:solidFill>
                   <a:schemeClr val="tx1"/>
                 </a:solidFill>
@@ -22175,7 +22067,7 @@
           <a:p>
             <a:pPr algn="ctr"/>
             <a:r>
-              <a:rPr lang="en-US" sz="1000" err="1" smtClean="0">
+              <a:rPr lang="en-US" sz="1000" err="1">
                 <a:solidFill>
                   <a:schemeClr val="tx1"/>
                 </a:solidFill>
@@ -22235,7 +22127,7 @@
           <a:p>
             <a:pPr algn="ctr"/>
             <a:r>
-              <a:rPr lang="en-US" sz="1000" err="1" smtClean="0">
+              <a:rPr lang="en-US" sz="1000" err="1">
                 <a:solidFill>
                   <a:schemeClr val="tx1"/>
                 </a:solidFill>
@@ -22300,15 +22192,7 @@
                   <a:schemeClr val="tx1"/>
                 </a:solidFill>
               </a:rPr>
-              <a:t>Re</a:t>
-            </a:r>
-            <a:r>
-              <a:rPr lang="en-US" sz="1000" err="1" smtClean="0">
-                <a:solidFill>
-                  <a:schemeClr val="tx1"/>
-                </a:solidFill>
-              </a:rPr>
-              <a:t>quirement W</a:t>
+              <a:t>Requirement W</a:t>
             </a:r>
             <a:endParaRPr lang="en-US" sz="1000">
               <a:solidFill>
@@ -22368,15 +22252,7 @@
                   <a:schemeClr val="tx1"/>
                 </a:solidFill>
               </a:rPr>
-              <a:t>Re</a:t>
-            </a:r>
-            <a:r>
-              <a:rPr lang="en-US" sz="1000" err="1" smtClean="0">
-                <a:solidFill>
-                  <a:schemeClr val="tx1"/>
-                </a:solidFill>
-              </a:rPr>
-              <a:t>quirement X</a:t>
+              <a:t>Requirement X</a:t>
             </a:r>
             <a:endParaRPr lang="en-US" sz="1000">
               <a:solidFill>
@@ -22436,15 +22312,7 @@
                   <a:schemeClr val="tx1"/>
                 </a:solidFill>
               </a:rPr>
-              <a:t>Re</a:t>
-            </a:r>
-            <a:r>
-              <a:rPr lang="en-US" sz="1000" err="1" smtClean="0">
-                <a:solidFill>
-                  <a:schemeClr val="tx1"/>
-                </a:solidFill>
-              </a:rPr>
-              <a:t>quirement Y</a:t>
+              <a:t>Requirement Y</a:t>
             </a:r>
             <a:endParaRPr lang="en-US" sz="1000">
               <a:solidFill>
@@ -22499,7 +22367,7 @@
           <a:p>
             <a:pPr algn="ctr"/>
             <a:r>
-              <a:rPr lang="en-US" sz="1000" err="1" smtClean="0">
+              <a:rPr lang="en-US" sz="1000" err="1">
                 <a:solidFill>
                   <a:schemeClr val="tx1"/>
                 </a:solidFill>
@@ -22561,7 +22429,7 @@
           <a:p>
             <a:pPr algn="ctr"/>
             <a:r>
-              <a:rPr lang="en-US" sz="1000" err="1" smtClean="0">
+              <a:rPr lang="en-US" sz="1000" err="1">
                 <a:solidFill>
                   <a:schemeClr val="tx1"/>
                 </a:solidFill>
@@ -22664,7 +22532,7 @@
           <a:p>
             <a:pPr algn="ctr"/>
             <a:r>
-              <a:rPr lang="en-US" sz="1000" err="1" smtClean="0">
+              <a:rPr lang="en-US" sz="1000" err="1">
                 <a:solidFill>
                   <a:schemeClr val="tx1"/>
                 </a:solidFill>
@@ -23205,7 +23073,7 @@
           <a:p>
             <a:pPr algn="ctr"/>
             <a:r>
-              <a:rPr lang="en-US" sz="1000" err="1" smtClean="0">
+              <a:rPr lang="en-US" sz="1000" err="1">
                 <a:solidFill>
                   <a:schemeClr val="tx1"/>
                 </a:solidFill>
@@ -23739,7 +23607,7 @@
               </a:spcAft>
             </a:pPr>
             <a:r>
-              <a:rPr lang="en-AU" sz="1000" smtClean="0">
+              <a:rPr lang="en-AU" sz="1000">
                 <a:solidFill>
                   <a:srgbClr val="00B050"/>
                 </a:solidFill>
@@ -24277,7 +24145,7 @@
               </a:spcAft>
             </a:pPr>
             <a:r>
-              <a:rPr lang="en-AU" sz="1000" smtClean="0">
+              <a:rPr lang="en-AU" sz="1000">
                 <a:solidFill>
                   <a:srgbClr val="C00000"/>
                 </a:solidFill>
@@ -25261,7 +25129,7 @@
           <a:p>
             <a:pPr algn="ctr"/>
             <a:r>
-              <a:rPr lang="en-US" sz="1000" err="1" smtClean="0">
+              <a:rPr lang="en-US" sz="1000" err="1">
                 <a:solidFill>
                   <a:schemeClr val="tx1"/>
                 </a:solidFill>
@@ -26492,7 +26360,7 @@
           <a:p>
             <a:pPr algn="ctr"/>
             <a:r>
-              <a:rPr lang="en-US" sz="1000" err="1" smtClean="0">
+              <a:rPr lang="en-US" sz="1000" err="1">
                 <a:solidFill>
                   <a:schemeClr val="tx1"/>
                 </a:solidFill>
@@ -26552,7 +26420,7 @@
           <a:p>
             <a:pPr algn="ctr"/>
             <a:r>
-              <a:rPr lang="en-US" sz="1000" err="1" smtClean="0">
+              <a:rPr lang="en-US" sz="1000" err="1">
                 <a:solidFill>
                   <a:schemeClr val="tx1"/>
                 </a:solidFill>
@@ -26672,7 +26540,7 @@
           <a:p>
             <a:pPr algn="ctr"/>
             <a:r>
-              <a:rPr lang="en-US" sz="1000" err="1" smtClean="0">
+              <a:rPr lang="en-US" sz="1000" err="1">
                 <a:solidFill>
                   <a:schemeClr val="tx1"/>
                 </a:solidFill>
@@ -26792,7 +26660,7 @@
           <a:p>
             <a:pPr algn="ctr"/>
             <a:r>
-              <a:rPr lang="en-US" sz="1000" err="1" smtClean="0">
+              <a:rPr lang="en-US" sz="1000" err="1">
                 <a:solidFill>
                   <a:schemeClr val="tx1"/>
                 </a:solidFill>
@@ -27193,7 +27061,7 @@
           <a:p>
             <a:pPr algn="ctr"/>
             <a:r>
-              <a:rPr lang="en-US" sz="1000" err="1" smtClean="0">
+              <a:rPr lang="en-US" sz="1000" err="1">
                 <a:solidFill>
                   <a:schemeClr val="tx1"/>
                 </a:solidFill>
@@ -27586,7 +27454,7 @@
           <a:p>
             <a:pPr algn="ctr"/>
             <a:r>
-              <a:rPr lang="en-US" sz="1000" err="1" smtClean="0">
+              <a:rPr lang="en-US" sz="1000" err="1">
                 <a:solidFill>
                   <a:schemeClr val="tx1"/>
                 </a:solidFill>
@@ -28726,7 +28594,7 @@
           <a:p>
             <a:pPr algn="ctr"/>
             <a:r>
-              <a:rPr lang="en-US" sz="1000" err="1" smtClean="0">
+              <a:rPr lang="en-US" sz="1000" err="1">
                 <a:solidFill>
                   <a:schemeClr val="tx1"/>
                 </a:solidFill>
@@ -28786,7 +28654,7 @@
           <a:p>
             <a:pPr algn="ctr"/>
             <a:r>
-              <a:rPr lang="en-US" sz="1000" err="1" smtClean="0">
+              <a:rPr lang="en-US" sz="1000" err="1">
                 <a:solidFill>
                   <a:schemeClr val="tx1"/>
                 </a:solidFill>
@@ -28906,7 +28774,7 @@
           <a:p>
             <a:pPr algn="ctr"/>
             <a:r>
-              <a:rPr lang="en-US" sz="1000" err="1" smtClean="0">
+              <a:rPr lang="en-US" sz="1000" err="1">
                 <a:solidFill>
                   <a:schemeClr val="tx1"/>
                 </a:solidFill>
@@ -29187,7 +29055,7 @@
           <a:p>
             <a:pPr algn="ctr"/>
             <a:r>
-              <a:rPr lang="en-US" sz="1000" err="1" smtClean="0">
+              <a:rPr lang="en-US" sz="1000" err="1">
                 <a:solidFill>
                   <a:schemeClr val="tx1"/>
                 </a:solidFill>
@@ -29448,7 +29316,7 @@
           <a:p>
             <a:pPr algn="ctr"/>
             <a:r>
-              <a:rPr lang="en-US" sz="1000" err="1" smtClean="0">
+              <a:rPr lang="en-US" sz="1000" err="1">
                 <a:solidFill>
                   <a:srgbClr val="00B050"/>
                 </a:solidFill>
@@ -29508,7 +29376,7 @@
           <a:p>
             <a:pPr algn="ctr"/>
             <a:r>
-              <a:rPr lang="en-US" sz="1000" err="1" smtClean="0">
+              <a:rPr lang="en-US" sz="1000" err="1">
                 <a:solidFill>
                   <a:srgbClr val="C00000"/>
                 </a:solidFill>
@@ -29708,7 +29576,7 @@
               </a:spcAft>
             </a:pPr>
             <a:r>
-              <a:rPr lang="en-AU" sz="800" err="1" smtClean="0">
+              <a:rPr lang="en-AU" sz="800" err="1">
                 <a:effectLst/>
                 <a:latin typeface="Calibri" charset="0"/>
                 <a:ea typeface="Calibri" charset="0"/>
@@ -29770,7 +29638,7 @@
           <a:p>
             <a:pPr algn="ctr"/>
             <a:r>
-              <a:rPr lang="en-US" sz="1000" err="1" smtClean="0">
+              <a:rPr lang="en-US" sz="1000" err="1">
                 <a:solidFill>
                   <a:schemeClr val="tx1"/>
                 </a:solidFill>
@@ -29832,7 +29700,7 @@
           <a:p>
             <a:pPr algn="ctr"/>
             <a:r>
-              <a:rPr lang="en-US" sz="1000" err="1" smtClean="0">
+              <a:rPr lang="en-US" sz="1000" err="1">
                 <a:solidFill>
                   <a:schemeClr val="tx1"/>
                 </a:solidFill>
@@ -30037,7 +29905,7 @@
           <a:p>
             <a:pPr algn="ctr"/>
             <a:r>
-              <a:rPr lang="en-US" sz="1000" err="1" smtClean="0">
+              <a:rPr lang="en-US" sz="1000" err="1">
                 <a:solidFill>
                   <a:schemeClr val="tx1"/>
                 </a:solidFill>
@@ -30359,7 +30227,7 @@
           <a:p>
             <a:pPr algn="ctr"/>
             <a:r>
-              <a:rPr lang="en-US" sz="1000" err="1" smtClean="0">
+              <a:rPr lang="en-US" sz="1000" err="1">
                 <a:solidFill>
                   <a:schemeClr val="tx1"/>
                 </a:solidFill>
@@ -30421,7 +30289,7 @@
           <a:p>
             <a:pPr algn="ctr"/>
             <a:r>
-              <a:rPr lang="en-US" sz="1000" err="1" smtClean="0">
+              <a:rPr lang="en-US" sz="1000" err="1">
                 <a:solidFill>
                   <a:schemeClr val="tx1"/>
                 </a:solidFill>
@@ -30483,7 +30351,7 @@
           <a:p>
             <a:pPr algn="ctr"/>
             <a:r>
-              <a:rPr lang="en-US" sz="1000" err="1" smtClean="0">
+              <a:rPr lang="en-US" sz="1000" err="1">
                 <a:solidFill>
                   <a:schemeClr val="tx1"/>
                 </a:solidFill>
@@ -30545,7 +30413,7 @@
           <a:p>
             <a:pPr algn="ctr"/>
             <a:r>
-              <a:rPr lang="en-US" sz="1000" err="1" smtClean="0">
+              <a:rPr lang="en-US" sz="1000" err="1">
                 <a:solidFill>
                   <a:schemeClr val="tx1"/>
                 </a:solidFill>
@@ -30612,15 +30480,7 @@
                   <a:schemeClr val="tx1"/>
                 </a:solidFill>
               </a:rPr>
-              <a:t>Re</a:t>
-            </a:r>
-            <a:r>
-              <a:rPr lang="en-US" sz="1000" err="1" smtClean="0">
-                <a:solidFill>
-                  <a:schemeClr val="tx1"/>
-                </a:solidFill>
-              </a:rPr>
-              <a:t>quirement</a:t>
+              <a:t>Requirement</a:t>
             </a:r>
             <a:endParaRPr lang="en-US" sz="1000">
               <a:solidFill>
@@ -30703,7 +30563,7 @@
               </a:spcAft>
             </a:pPr>
             <a:r>
-              <a:rPr lang="en-AU" sz="800" err="1" smtClean="0">
+              <a:rPr lang="en-AU" sz="800" err="1">
                 <a:effectLst/>
                 <a:latin typeface="Calibri" charset="0"/>
                 <a:ea typeface="Calibri" charset="0"/>
@@ -30765,7 +30625,7 @@
           <a:p>
             <a:pPr algn="ctr"/>
             <a:r>
-              <a:rPr lang="en-US" sz="1000" err="1" smtClean="0">
+              <a:rPr lang="en-US" sz="1000" err="1">
                 <a:solidFill>
                   <a:schemeClr val="tx1"/>
                 </a:solidFill>
@@ -30827,7 +30687,7 @@
           <a:p>
             <a:pPr algn="ctr"/>
             <a:r>
-              <a:rPr lang="en-US" sz="1000" err="1" smtClean="0">
+              <a:rPr lang="en-US" sz="1000" err="1">
                 <a:solidFill>
                   <a:schemeClr val="tx1"/>
                 </a:solidFill>
@@ -30941,7 +30801,7 @@
           <a:p>
             <a:pPr algn="ctr"/>
             <a:r>
-              <a:rPr lang="en-AU" sz="1000" smtClean="0">
+              <a:rPr lang="en-AU" sz="1000">
                 <a:solidFill>
                   <a:schemeClr val="tx1"/>
                 </a:solidFill>
@@ -31094,7 +30954,7 @@
           <a:p>
             <a:pPr algn="ctr"/>
             <a:r>
-              <a:rPr lang="en-US" sz="1000" err="1" smtClean="0">
+              <a:rPr lang="en-US" sz="1000" err="1">
                 <a:solidFill>
                   <a:schemeClr val="tx1"/>
                 </a:solidFill>
@@ -31436,7 +31296,7 @@
               </a:spcAft>
             </a:pPr>
             <a:r>
-              <a:rPr lang="en-AU" sz="1000" smtClean="0">
+              <a:rPr lang="en-AU" sz="1000">
                 <a:effectLst/>
                 <a:ea typeface="Calibri" charset="0"/>
                 <a:cs typeface="Calibri" charset="0"/>
@@ -31513,7 +31373,7 @@
               </a:spcAft>
             </a:pPr>
             <a:r>
-              <a:rPr lang="en-AU" sz="1000" smtClean="0">
+              <a:rPr lang="en-AU" sz="1000">
                 <a:effectLst/>
                 <a:ea typeface="Calibri" charset="0"/>
                 <a:cs typeface="Calibri" charset="0"/>
@@ -31845,7 +31705,7 @@
           <a:p>
             <a:pPr algn="ctr"/>
             <a:r>
-              <a:rPr lang="en-US" sz="1000" err="1" smtClean="0">
+              <a:rPr lang="en-US" sz="1000" err="1">
                 <a:solidFill>
                   <a:schemeClr val="tx1"/>
                 </a:solidFill>
@@ -31907,7 +31767,7 @@
           <a:p>
             <a:pPr algn="ctr"/>
             <a:r>
-              <a:rPr lang="en-US" sz="1000" err="1" smtClean="0">
+              <a:rPr lang="en-US" sz="1000" err="1">
                 <a:solidFill>
                   <a:schemeClr val="tx1"/>
                 </a:solidFill>
@@ -31969,7 +31829,7 @@
           <a:p>
             <a:pPr algn="ctr"/>
             <a:r>
-              <a:rPr lang="en-US" sz="1000" err="1" smtClean="0">
+              <a:rPr lang="en-US" sz="1000" err="1">
                 <a:solidFill>
                   <a:schemeClr val="tx1"/>
                 </a:solidFill>
@@ -32031,7 +31891,7 @@
           <a:p>
             <a:pPr algn="ctr"/>
             <a:r>
-              <a:rPr lang="en-US" sz="1000" err="1" smtClean="0">
+              <a:rPr lang="en-US" sz="1000" err="1">
                 <a:solidFill>
                   <a:schemeClr val="tx1"/>
                 </a:solidFill>
@@ -32098,15 +31958,7 @@
                   <a:schemeClr val="tx1"/>
                 </a:solidFill>
               </a:rPr>
-              <a:t>Re</a:t>
-            </a:r>
-            <a:r>
-              <a:rPr lang="en-US" sz="1000" err="1" smtClean="0">
-                <a:solidFill>
-                  <a:schemeClr val="tx1"/>
-                </a:solidFill>
-              </a:rPr>
-              <a:t>quirement</a:t>
+              <a:t>Requirement</a:t>
             </a:r>
             <a:endParaRPr lang="en-US" sz="1000">
               <a:solidFill>
@@ -32219,7 +32071,7 @@
               </a:spcAft>
             </a:pPr>
             <a:r>
-              <a:rPr lang="en-AU" sz="800" err="1" smtClean="0">
+              <a:rPr lang="en-AU" sz="800" err="1">
                 <a:effectLst/>
                 <a:latin typeface="Calibri" charset="0"/>
                 <a:ea typeface="Calibri" charset="0"/>
@@ -32281,7 +32133,7 @@
           <a:p>
             <a:pPr algn="ctr"/>
             <a:r>
-              <a:rPr lang="en-US" sz="1000" err="1" smtClean="0">
+              <a:rPr lang="en-US" sz="1000" err="1">
                 <a:solidFill>
                   <a:schemeClr val="tx1"/>
                 </a:solidFill>
@@ -32343,7 +32195,7 @@
           <a:p>
             <a:pPr algn="ctr"/>
             <a:r>
-              <a:rPr lang="en-US" sz="1000" err="1" smtClean="0">
+              <a:rPr lang="en-US" sz="1000" err="1">
                 <a:solidFill>
                   <a:schemeClr val="tx1"/>
                 </a:solidFill>
@@ -32548,7 +32400,7 @@
           <a:p>
             <a:pPr algn="ctr"/>
             <a:r>
-              <a:rPr lang="en-US" sz="1000" err="1" smtClean="0">
+              <a:rPr lang="en-US" sz="1000" err="1">
                 <a:solidFill>
                   <a:schemeClr val="tx1"/>
                 </a:solidFill>
@@ -32870,7 +32722,7 @@
           <a:p>
             <a:pPr algn="ctr"/>
             <a:r>
-              <a:rPr lang="en-US" sz="1000" err="1" smtClean="0">
+              <a:rPr lang="en-US" sz="1000" err="1">
                 <a:solidFill>
                   <a:schemeClr val="tx1"/>
                 </a:solidFill>
@@ -32932,7 +32784,7 @@
           <a:p>
             <a:pPr algn="ctr"/>
             <a:r>
-              <a:rPr lang="en-US" sz="1000" err="1" smtClean="0">
+              <a:rPr lang="en-US" sz="1000" err="1">
                 <a:solidFill>
                   <a:schemeClr val="tx1"/>
                 </a:solidFill>
@@ -32994,7 +32846,7 @@
           <a:p>
             <a:pPr algn="ctr"/>
             <a:r>
-              <a:rPr lang="en-US" sz="1000" err="1" smtClean="0">
+              <a:rPr lang="en-US" sz="1000" err="1">
                 <a:solidFill>
                   <a:schemeClr val="tx1"/>
                 </a:solidFill>
@@ -33017,7 +32869,7 @@
         </p:nvSpPr>
         <p:spPr>
           <a:xfrm>
-            <a:off x="6417740" y="4265617"/>
+            <a:off x="6420335" y="4456157"/>
             <a:ext cx="1234692" cy="523924"/>
           </a:xfrm>
           <a:prstGeom prst="ellipse">
@@ -33061,15 +32913,7 @@
                   <a:schemeClr val="tx1"/>
                 </a:solidFill>
               </a:rPr>
-              <a:t>Re</a:t>
-            </a:r>
-            <a:r>
-              <a:rPr lang="en-US" sz="1000" err="1" smtClean="0">
-                <a:solidFill>
-                  <a:schemeClr val="tx1"/>
-                </a:solidFill>
-              </a:rPr>
-              <a:t>quirement</a:t>
+              <a:t>Requirement</a:t>
             </a:r>
             <a:endParaRPr lang="en-US" sz="1000">
               <a:solidFill>
@@ -33081,45 +32925,6 @@
       </p:sp>
       <p:cxnSp>
         <p:nvCxnSpPr>
-          <p:cNvPr id="45" name="Elbow Connector 44"/>
-          <p:cNvCxnSpPr/>
-          <p:nvPr/>
-        </p:nvCxnSpPr>
-        <p:spPr>
-          <a:xfrm>
-            <a:off x="7655027" y="3790645"/>
-            <a:ext cx="924443" cy="762326"/>
-          </a:xfrm>
-          <a:prstGeom prst="bentConnector3">
-            <a:avLst>
-              <a:gd name="adj1" fmla="val 50000"/>
-            </a:avLst>
-          </a:prstGeom>
-          <a:ln>
-            <a:solidFill>
-              <a:schemeClr val="tx1"/>
-            </a:solidFill>
-            <a:headEnd type="none"/>
-            <a:tailEnd type="arrow"/>
-          </a:ln>
-        </p:spPr>
-        <p:style>
-          <a:lnRef idx="1">
-            <a:schemeClr val="accent1"/>
-          </a:lnRef>
-          <a:fillRef idx="0">
-            <a:schemeClr val="accent1"/>
-          </a:fillRef>
-          <a:effectRef idx="0">
-            <a:schemeClr val="accent1"/>
-          </a:effectRef>
-          <a:fontRef idx="minor">
-            <a:schemeClr val="tx1"/>
-          </a:fontRef>
-        </p:style>
-      </p:cxnSp>
-      <p:cxnSp>
-        <p:nvCxnSpPr>
           <p:cNvPr id="47" name="Straight Arrow Connector 46"/>
           <p:cNvCxnSpPr/>
           <p:nvPr/>
@@ -33163,8 +32968,8 @@
         </p:nvSpPr>
         <p:spPr>
           <a:xfrm>
-            <a:off x="8212146" y="4058837"/>
-            <a:ext cx="922309" cy="162804"/>
+            <a:off x="9199188" y="4068418"/>
+            <a:ext cx="922309" cy="368150"/>
           </a:xfrm>
           <a:prstGeom prst="rect">
             <a:avLst/>
@@ -33198,7 +33003,20 @@
                 <a:latin typeface="Calibri" charset="0"/>
                 <a:ea typeface="Calibri" charset="0"/>
               </a:rPr>
-              <a:t>wasStartedBy</a:t>
+              <a:t>qualifiedStart/</a:t>
+            </a:r>
+            <a:br>
+              <a:rPr lang="en-AU" sz="1000">
+                <a:latin typeface="Calibri" charset="0"/>
+                <a:ea typeface="Calibri" charset="0"/>
+              </a:rPr>
+            </a:br>
+            <a:r>
+              <a:rPr lang="en-AU" sz="1000">
+                <a:latin typeface="Calibri" charset="0"/>
+                <a:ea typeface="Calibri" charset="0"/>
+              </a:rPr>
+              <a:t>hadActivity</a:t>
             </a:r>
             <a:endParaRPr lang="en-GB" sz="1000">
               <a:effectLst/>
@@ -33319,7 +33137,7 @@
         </p:nvSpPr>
         <p:spPr>
           <a:xfrm>
-            <a:off x="8737163" y="2489943"/>
+            <a:off x="8048672" y="2489943"/>
             <a:ext cx="1065498" cy="261962"/>
           </a:xfrm>
           <a:prstGeom prst="rect">
@@ -33370,7 +33188,7 @@
         </p:nvSpPr>
         <p:spPr>
           <a:xfrm>
-            <a:off x="7616341" y="4795951"/>
+            <a:off x="7630640" y="4463916"/>
             <a:ext cx="922309" cy="246540"/>
           </a:xfrm>
           <a:prstGeom prst="rect">
@@ -33459,7 +33277,7 @@
         </p:nvSpPr>
         <p:spPr>
           <a:xfrm>
-            <a:off x="8579470" y="4311921"/>
+            <a:off x="8579470" y="4473291"/>
             <a:ext cx="1080873" cy="482100"/>
           </a:xfrm>
           <a:prstGeom prst="rect">
@@ -33498,7 +33316,7 @@
           <a:p>
             <a:pPr algn="ctr"/>
             <a:r>
-              <a:rPr lang="en-US" sz="1000" err="1" smtClean="0">
+              <a:rPr lang="en-US" sz="1000" err="1">
                 <a:solidFill>
                   <a:schemeClr val="tx1"/>
                 </a:solidFill>
@@ -33656,7 +33474,7 @@
                   <a:schemeClr val="tx1"/>
                 </a:solidFill>
               </a:rPr>
-              <a:t>Agent</a:t>
+              <a:t>prov:Agent</a:t>
             </a:r>
             <a:endParaRPr lang="en-US" sz="1000">
               <a:solidFill>
@@ -33716,45 +33534,6 @@
           </a:xfrm>
           <a:prstGeom prst="bentConnector2">
             <a:avLst/>
-          </a:prstGeom>
-          <a:ln>
-            <a:solidFill>
-              <a:schemeClr val="tx1"/>
-            </a:solidFill>
-            <a:headEnd type="arrow"/>
-            <a:tailEnd type="none"/>
-          </a:ln>
-        </p:spPr>
-        <p:style>
-          <a:lnRef idx="1">
-            <a:schemeClr val="accent1"/>
-          </a:lnRef>
-          <a:fillRef idx="0">
-            <a:schemeClr val="accent1"/>
-          </a:fillRef>
-          <a:effectRef idx="0">
-            <a:schemeClr val="accent1"/>
-          </a:effectRef>
-          <a:fontRef idx="minor">
-            <a:schemeClr val="tx1"/>
-          </a:fontRef>
-        </p:style>
-      </p:cxnSp>
-      <p:cxnSp>
-        <p:nvCxnSpPr>
-          <p:cNvPr id="63" name="Elbow Connector 62"/>
-          <p:cNvCxnSpPr/>
-          <p:nvPr/>
-        </p:nvCxnSpPr>
-        <p:spPr>
-          <a:xfrm>
-            <a:off x="7576418" y="2749732"/>
-            <a:ext cx="2083925" cy="1803239"/>
-          </a:xfrm>
-          <a:prstGeom prst="bentConnector3">
-            <a:avLst>
-              <a:gd name="adj1" fmla="val 110970"/>
-            </a:avLst>
           </a:prstGeom>
           <a:ln>
             <a:solidFill>
@@ -33832,18 +33611,59 @@
       </p:sp>
       <p:cxnSp>
         <p:nvCxnSpPr>
-          <p:cNvPr id="65" name="Elbow Connector 64"/>
+          <p:cNvPr id="70" name="Straight Arrow Connector 69"/>
+          <p:cNvCxnSpPr>
+            <a:cxnSpLocks/>
+            <a:stCxn id="59" idx="0"/>
+          </p:cNvCxnSpPr>
+          <p:nvPr/>
+        </p:nvCxnSpPr>
+        <p:spPr>
+          <a:xfrm flipV="1">
+            <a:off x="9119907" y="4031695"/>
+            <a:ext cx="0" cy="441596"/>
+          </a:xfrm>
+          <a:prstGeom prst="straightConnector1">
+            <a:avLst/>
+          </a:prstGeom>
+          <a:ln>
+            <a:solidFill>
+              <a:schemeClr val="tx1"/>
+            </a:solidFill>
+            <a:headEnd type="none" w="med" len="med"/>
+            <a:tailEnd type="arrow" w="med" len="med"/>
+          </a:ln>
+        </p:spPr>
+        <p:style>
+          <a:lnRef idx="1">
+            <a:schemeClr val="accent1"/>
+          </a:lnRef>
+          <a:fillRef idx="0">
+            <a:schemeClr val="accent1"/>
+          </a:fillRef>
+          <a:effectRef idx="0">
+            <a:schemeClr val="accent1"/>
+          </a:effectRef>
+          <a:fontRef idx="minor">
+            <a:schemeClr val="tx1"/>
+          </a:fontRef>
+        </p:style>
+      </p:cxnSp>
+      <p:cxnSp>
+        <p:nvCxnSpPr>
+          <p:cNvPr id="71" name="Elbow Connector 70"/>
           <p:cNvCxnSpPr/>
           <p:nvPr/>
         </p:nvCxnSpPr>
         <p:spPr>
           <a:xfrm rot="16200000" flipH="1">
-            <a:off x="8075256" y="3749370"/>
-            <a:ext cx="4480" cy="2084821"/>
-          </a:xfrm>
-          <a:prstGeom prst="bentConnector3">
+            <a:off x="7202636" y="1332938"/>
+            <a:ext cx="261962" cy="4653452"/>
+          </a:xfrm>
+          <a:prstGeom prst="bentConnector4">
             <a:avLst>
-              <a:gd name="adj1" fmla="val 5202679"/>
+              <a:gd name="adj1" fmla="val -453776"/>
+              <a:gd name="adj2" fmla="val 108449"/>
             </a:avLst>
           </a:prstGeom>
           <a:ln>
@@ -33871,118 +33691,14 @@
       </p:cxnSp>
       <p:sp>
         <p:nvSpPr>
-          <p:cNvPr id="67" name="Rectangle: Rounded Corners 198"/>
-          <p:cNvSpPr/>
-          <p:nvPr/>
-        </p:nvSpPr>
-        <p:spPr>
-          <a:xfrm>
-            <a:off x="4445583" y="4279689"/>
-            <a:ext cx="1129097" cy="495779"/>
-          </a:xfrm>
-          <a:prstGeom prst="roundRect">
-            <a:avLst/>
-          </a:prstGeom>
-          <a:ln>
-            <a:solidFill>
-              <a:schemeClr val="tx1"/>
-            </a:solidFill>
-          </a:ln>
-        </p:spPr>
-        <p:style>
-          <a:lnRef idx="2">
-            <a:schemeClr val="accent6"/>
-          </a:lnRef>
-          <a:fillRef idx="1">
-            <a:schemeClr val="lt1"/>
-          </a:fillRef>
-          <a:effectRef idx="0">
-            <a:schemeClr val="accent6"/>
-          </a:effectRef>
-          <a:fontRef idx="minor">
-            <a:schemeClr val="dk1"/>
-          </a:fontRef>
-        </p:style>
-        <p:txBody>
-          <a:bodyPr rot="0" spcFirstLastPara="0" vert="horz" wrap="square" lIns="91440" tIns="45720" rIns="91440" bIns="45720" numCol="1" spcCol="0" rtlCol="0" fromWordArt="0" anchor="ctr" anchorCtr="0" forceAA="0" compatLnSpc="1">
-            <a:prstTxWarp prst="textNoShape">
-              <a:avLst/>
-            </a:prstTxWarp>
-            <a:noAutofit/>
-          </a:bodyPr>
-          <a:lstStyle/>
-          <a:p>
-            <a:pPr algn="ctr">
-              <a:lnSpc>
-                <a:spcPct val="106000"/>
-              </a:lnSpc>
-              <a:spcAft>
-                <a:spcPts val="800"/>
-              </a:spcAft>
-            </a:pPr>
-            <a:r>
-              <a:rPr lang="en-AU" sz="1000">
-                <a:effectLst/>
-                <a:ea typeface="Calibri" charset="0"/>
-                <a:cs typeface="Calibri" charset="0"/>
-              </a:rPr>
-              <a:t>OWL Class</a:t>
-            </a:r>
-            <a:endParaRPr lang="en-GB" sz="1000">
-              <a:effectLst/>
-              <a:latin typeface="Times New Roman" charset="0"/>
-              <a:ea typeface="Times New Roman" charset="0"/>
-            </a:endParaRPr>
-          </a:p>
-        </p:txBody>
-      </p:sp>
-      <p:cxnSp>
-        <p:nvCxnSpPr>
-          <p:cNvPr id="68" name="Straight Arrow Connector 67"/>
-          <p:cNvCxnSpPr/>
-          <p:nvPr/>
-        </p:nvCxnSpPr>
-        <p:spPr>
-          <a:xfrm flipV="1">
-            <a:off x="5010132" y="3975880"/>
-            <a:ext cx="1591019" cy="303809"/>
-          </a:xfrm>
-          <a:prstGeom prst="straightConnector1">
-            <a:avLst/>
-          </a:prstGeom>
-          <a:ln>
-            <a:solidFill>
-              <a:schemeClr val="tx1"/>
-            </a:solidFill>
-            <a:prstDash val="dash"/>
-            <a:tailEnd type="triangle"/>
-          </a:ln>
-        </p:spPr>
-        <p:style>
-          <a:lnRef idx="1">
-            <a:schemeClr val="accent1"/>
-          </a:lnRef>
-          <a:fillRef idx="0">
-            <a:schemeClr val="accent1"/>
-          </a:fillRef>
-          <a:effectRef idx="0">
-            <a:schemeClr val="accent1"/>
-          </a:effectRef>
-          <a:fontRef idx="minor">
-            <a:schemeClr val="tx1"/>
-          </a:fontRef>
-        </p:style>
-      </p:cxnSp>
-      <p:sp>
-        <p:nvSpPr>
-          <p:cNvPr id="69" name="Text Box 34"/>
+          <p:cNvPr id="73" name="Text Box 34"/>
           <p:cNvSpPr txBox="1"/>
           <p:nvPr/>
         </p:nvSpPr>
         <p:spPr>
           <a:xfrm>
-            <a:off x="5097861" y="4997964"/>
-            <a:ext cx="922309" cy="246540"/>
+            <a:off x="5006891" y="2314208"/>
+            <a:ext cx="922309" cy="162804"/>
           </a:xfrm>
           <a:prstGeom prst="rect">
             <a:avLst/>
@@ -34011,11 +33727,10 @@
             </a:pPr>
             <a:r>
               <a:rPr lang="en-AU" sz="1000">
-                <a:effectLst/>
                 <a:latin typeface="Calibri" charset="0"/>
                 <a:ea typeface="Calibri" charset="0"/>
               </a:rPr>
-              <a:t>wasGeneratedBy</a:t>
+              <a:t>wasStartedBy</a:t>
             </a:r>
             <a:endParaRPr lang="en-GB" sz="1000">
               <a:effectLst/>
@@ -34027,14 +33742,24 @@
       </p:sp>
       <p:cxnSp>
         <p:nvCxnSpPr>
-          <p:cNvPr id="70" name="Straight Arrow Connector 69"/>
-          <p:cNvCxnSpPr/>
+          <p:cNvPr id="46" name="Straight Arrow Connector 45">
+            <a:extLst>
+              <a:ext uri="{FF2B5EF4-FFF2-40B4-BE49-F238E27FC236}">
+                <a16:creationId xmlns:a16="http://schemas.microsoft.com/office/drawing/2014/main" id="{727427B1-36F8-8B44-9860-8ECBDA86238E}"/>
+              </a:ext>
+            </a:extLst>
+          </p:cNvPr>
+          <p:cNvCxnSpPr>
+            <a:cxnSpLocks/>
+            <a:stCxn id="44" idx="6"/>
+            <a:endCxn id="59" idx="1"/>
+          </p:cNvCxnSpPr>
           <p:nvPr/>
         </p:nvCxnSpPr>
         <p:spPr>
           <a:xfrm flipV="1">
-            <a:off x="9119907" y="4031695"/>
-            <a:ext cx="0" cy="280226"/>
+            <a:off x="7655027" y="4714341"/>
+            <a:ext cx="924443" cy="3778"/>
           </a:xfrm>
           <a:prstGeom prst="straightConnector1">
             <a:avLst/>
@@ -34043,8 +33768,8 @@
             <a:solidFill>
               <a:schemeClr val="tx1"/>
             </a:solidFill>
-            <a:headEnd type="none" w="med" len="med"/>
-            <a:tailEnd type="arrow" w="med" len="med"/>
+            <a:headEnd type="arrow" w="med" len="med"/>
+            <a:tailEnd type="none" w="med" len="med"/>
           </a:ln>
         </p:spPr>
         <p:style>
@@ -34064,27 +33789,33 @@
       </p:cxnSp>
       <p:cxnSp>
         <p:nvCxnSpPr>
-          <p:cNvPr id="71" name="Elbow Connector 70"/>
-          <p:cNvCxnSpPr/>
+          <p:cNvPr id="49" name="Straight Arrow Connector 48">
+            <a:extLst>
+              <a:ext uri="{FF2B5EF4-FFF2-40B4-BE49-F238E27FC236}">
+                <a16:creationId xmlns:a16="http://schemas.microsoft.com/office/drawing/2014/main" id="{578FF87F-724A-A449-AD0B-1F0FDE3DB9DF}"/>
+              </a:ext>
+            </a:extLst>
+          </p:cNvPr>
+          <p:cNvCxnSpPr>
+            <a:cxnSpLocks/>
+            <a:stCxn id="41" idx="5"/>
+          </p:cNvCxnSpPr>
           <p:nvPr/>
         </p:nvCxnSpPr>
         <p:spPr>
-          <a:xfrm rot="16200000" flipH="1">
-            <a:off x="7202636" y="1332938"/>
-            <a:ext cx="261962" cy="4653452"/>
-          </a:xfrm>
-          <a:prstGeom prst="bentConnector4">
-            <a:avLst>
-              <a:gd name="adj1" fmla="val -453776"/>
-              <a:gd name="adj2" fmla="val 108449"/>
-            </a:avLst>
+          <a:xfrm>
+            <a:off x="7474211" y="3975880"/>
+            <a:ext cx="1105259" cy="497411"/>
+          </a:xfrm>
+          <a:prstGeom prst="straightConnector1">
+            <a:avLst/>
           </a:prstGeom>
           <a:ln>
             <a:solidFill>
               <a:schemeClr val="tx1"/>
             </a:solidFill>
-            <a:headEnd type="arrow"/>
-            <a:tailEnd type="none"/>
+            <a:headEnd type="none" w="med" len="med"/>
+            <a:tailEnd type="arrow" w="med" len="med"/>
           </a:ln>
         </p:spPr>
         <p:style>
@@ -34104,14 +33835,20 @@
       </p:cxnSp>
       <p:sp>
         <p:nvSpPr>
-          <p:cNvPr id="73" name="Text Box 34"/>
+          <p:cNvPr id="52" name="Text Box 34">
+            <a:extLst>
+              <a:ext uri="{FF2B5EF4-FFF2-40B4-BE49-F238E27FC236}">
+                <a16:creationId xmlns:a16="http://schemas.microsoft.com/office/drawing/2014/main" id="{EED35946-47BD-7B49-A050-25B6C57DB257}"/>
+              </a:ext>
+            </a:extLst>
+          </p:cNvPr>
           <p:cNvSpPr txBox="1"/>
           <p:nvPr/>
         </p:nvSpPr>
         <p:spPr>
           <a:xfrm>
-            <a:off x="5006891" y="2314208"/>
-            <a:ext cx="922309" cy="162804"/>
+            <a:off x="6872462" y="4090227"/>
+            <a:ext cx="922309" cy="246540"/>
           </a:xfrm>
           <a:prstGeom prst="rect">
             <a:avLst/>
@@ -34140,10 +33877,11 @@
             </a:pPr>
             <a:r>
               <a:rPr lang="en-AU" sz="1000">
+                <a:effectLst/>
                 <a:latin typeface="Calibri" charset="0"/>
                 <a:ea typeface="Calibri" charset="0"/>
               </a:rPr>
-              <a:t>wasStartedBy</a:t>
+              <a:t>wasGeneratedBy</a:t>
             </a:r>
             <a:endParaRPr lang="en-GB" sz="1000">
               <a:effectLst/>
@@ -34153,45 +33891,6 @@
           </a:p>
         </p:txBody>
       </p:sp>
-      <p:cxnSp>
-        <p:nvCxnSpPr>
-          <p:cNvPr id="74" name="Elbow Connector 73"/>
-          <p:cNvCxnSpPr/>
-          <p:nvPr/>
-        </p:nvCxnSpPr>
-        <p:spPr>
-          <a:xfrm rot="16200000" flipH="1">
-            <a:off x="7181034" y="2604566"/>
-            <a:ext cx="18553" cy="4360356"/>
-          </a:xfrm>
-          <a:prstGeom prst="bentConnector3">
-            <a:avLst>
-              <a:gd name="adj1" fmla="val 2650256"/>
-            </a:avLst>
-          </a:prstGeom>
-          <a:ln>
-            <a:solidFill>
-              <a:schemeClr val="tx1"/>
-            </a:solidFill>
-            <a:headEnd type="none"/>
-            <a:tailEnd type="arrow"/>
-          </a:ln>
-        </p:spPr>
-        <p:style>
-          <a:lnRef idx="1">
-            <a:schemeClr val="accent1"/>
-          </a:lnRef>
-          <a:fillRef idx="0">
-            <a:schemeClr val="accent1"/>
-          </a:fillRef>
-          <a:effectRef idx="0">
-            <a:schemeClr val="accent1"/>
-          </a:effectRef>
-          <a:fontRef idx="minor">
-            <a:schemeClr val="tx1"/>
-          </a:fontRef>
-        </p:style>
-      </p:cxnSp>
     </p:spTree>
     <p:extLst>
       <p:ext uri="{BB962C8B-B14F-4D97-AF65-F5344CB8AC3E}">
@@ -35689,7 +35388,7 @@
               </a:spcAft>
             </a:pPr>
             <a:r>
-              <a:rPr lang="en-AU" sz="1000" smtClean="0">
+              <a:rPr lang="en-AU" sz="1000">
                 <a:effectLst/>
                 <a:ea typeface="Calibri" charset="0"/>
                 <a:cs typeface="Calibri" charset="0"/>
@@ -35766,7 +35465,7 @@
               </a:spcAft>
             </a:pPr>
             <a:r>
-              <a:rPr lang="en-AU" sz="1000" smtClean="0">
+              <a:rPr lang="en-AU" sz="1000">
                 <a:effectLst/>
                 <a:ea typeface="Calibri" charset="0"/>
                 <a:cs typeface="Calibri" charset="0"/>
@@ -35903,7 +35602,7 @@
               <a:t>is</a:t>
             </a:r>
             <a:r>
-              <a:rPr lang="en-AU" sz="800" smtClean="0">
+              <a:rPr lang="en-AU" sz="800">
                 <a:effectLst/>
                 <a:latin typeface="Calibri" charset="0"/>
                 <a:ea typeface="Calibri" charset="0"/>
@@ -35955,7 +35654,7 @@
               </a:spcAft>
             </a:pPr>
             <a:r>
-              <a:rPr lang="en-AU" sz="800" smtClean="0">
+              <a:rPr lang="en-AU" sz="800">
                 <a:effectLst/>
                 <a:latin typeface="Calibri" charset="0"/>
                 <a:ea typeface="Calibri" charset="0"/>
@@ -36016,7 +35715,7 @@
               <a:t>is</a:t>
             </a:r>
             <a:r>
-              <a:rPr lang="en-AU" sz="800" smtClean="0">
+              <a:rPr lang="en-AU" sz="800">
                 <a:effectLst/>
                 <a:latin typeface="Calibri" charset="0"/>
                 <a:ea typeface="Calibri" charset="0"/>
@@ -36190,6 +35889,1022 @@
     <p:extLst>
       <p:ext uri="{BB962C8B-B14F-4D97-AF65-F5344CB8AC3E}">
         <p14:creationId xmlns:p14="http://schemas.microsoft.com/office/powerpoint/2010/main" val="1941799067"/>
+      </p:ext>
+    </p:extLst>
+  </p:cSld>
+  <p:clrMapOvr>
+    <a:masterClrMapping/>
+  </p:clrMapOvr>
+</p:sld>
+</file>
+
+<file path=ppt/slides/slide20.xml><?xml version="1.0" encoding="utf-8"?>
+<p:sld xmlns:a="http://schemas.openxmlformats.org/drawingml/2006/main" xmlns:r="http://schemas.openxmlformats.org/officeDocument/2006/relationships" xmlns:p="http://schemas.openxmlformats.org/presentationml/2006/main">
+  <p:cSld>
+    <p:spTree>
+      <p:nvGrpSpPr>
+        <p:cNvPr id="1" name=""/>
+        <p:cNvGrpSpPr/>
+        <p:nvPr/>
+      </p:nvGrpSpPr>
+      <p:grpSpPr>
+        <a:xfrm>
+          <a:off x="0" y="0"/>
+          <a:ext cx="0" cy="0"/>
+          <a:chOff x="0" y="0"/>
+          <a:chExt cx="0" cy="0"/>
+        </a:xfrm>
+      </p:grpSpPr>
+      <p:sp>
+        <p:nvSpPr>
+          <p:cNvPr id="8" name="Oval 7"/>
+          <p:cNvSpPr/>
+          <p:nvPr/>
+        </p:nvSpPr>
+        <p:spPr>
+          <a:xfrm>
+            <a:off x="795186" y="1022063"/>
+            <a:ext cx="1234692" cy="523924"/>
+          </a:xfrm>
+          <a:prstGeom prst="ellipse">
+            <a:avLst/>
+          </a:prstGeom>
+          <a:solidFill>
+            <a:srgbClr val="FFFB8E"/>
+          </a:solidFill>
+          <a:ln>
+            <a:solidFill>
+              <a:srgbClr val="808080"/>
+            </a:solidFill>
+          </a:ln>
+        </p:spPr>
+        <p:style>
+          <a:lnRef idx="2">
+            <a:schemeClr val="accent1">
+              <a:shade val="50000"/>
+            </a:schemeClr>
+          </a:lnRef>
+          <a:fillRef idx="1">
+            <a:schemeClr val="accent1"/>
+          </a:fillRef>
+          <a:effectRef idx="0">
+            <a:schemeClr val="accent1"/>
+          </a:effectRef>
+          <a:fontRef idx="minor">
+            <a:schemeClr val="lt1"/>
+          </a:fontRef>
+        </p:style>
+        <p:txBody>
+          <a:bodyPr rtlCol="0" anchor="ctr"/>
+          <a:lstStyle/>
+          <a:p>
+            <a:pPr algn="ctr"/>
+            <a:r>
+              <a:rPr lang="en-US" sz="1000" err="1">
+                <a:solidFill>
+                  <a:schemeClr val="tx1"/>
+                </a:solidFill>
+              </a:rPr>
+              <a:t>prov:Entity</a:t>
+            </a:r>
+            <a:endParaRPr lang="en-US" sz="1000">
+              <a:solidFill>
+                <a:schemeClr val="tx1"/>
+              </a:solidFill>
+            </a:endParaRPr>
+          </a:p>
+        </p:txBody>
+      </p:sp>
+      <p:sp>
+        <p:nvSpPr>
+          <p:cNvPr id="9" name="Rectangle 8"/>
+          <p:cNvSpPr/>
+          <p:nvPr/>
+        </p:nvSpPr>
+        <p:spPr>
+          <a:xfrm>
+            <a:off x="3324794" y="1042975"/>
+            <a:ext cx="1120789" cy="482100"/>
+          </a:xfrm>
+          <a:prstGeom prst="rect">
+            <a:avLst/>
+          </a:prstGeom>
+          <a:solidFill>
+            <a:srgbClr val="A0B3FA"/>
+          </a:solidFill>
+          <a:ln>
+            <a:solidFill>
+              <a:srgbClr val="0B24FB"/>
+            </a:solidFill>
+          </a:ln>
+        </p:spPr>
+        <p:style>
+          <a:lnRef idx="2">
+            <a:schemeClr val="accent1">
+              <a:shade val="50000"/>
+            </a:schemeClr>
+          </a:lnRef>
+          <a:fillRef idx="1">
+            <a:schemeClr val="accent1"/>
+          </a:fillRef>
+          <a:effectRef idx="0">
+            <a:schemeClr val="accent1"/>
+          </a:effectRef>
+          <a:fontRef idx="minor">
+            <a:schemeClr val="lt1"/>
+          </a:fontRef>
+        </p:style>
+        <p:txBody>
+          <a:bodyPr rtlCol="0" anchor="ctr"/>
+          <a:lstStyle/>
+          <a:p>
+            <a:pPr algn="ctr"/>
+            <a:r>
+              <a:rPr lang="en-US" sz="1000" err="1">
+                <a:solidFill>
+                  <a:schemeClr val="tx1"/>
+                </a:solidFill>
+              </a:rPr>
+              <a:t>prov:Activity</a:t>
+            </a:r>
+            <a:endParaRPr lang="en-US" sz="1000">
+              <a:solidFill>
+                <a:schemeClr val="tx1"/>
+              </a:solidFill>
+            </a:endParaRPr>
+          </a:p>
+        </p:txBody>
+      </p:sp>
+      <p:sp>
+        <p:nvSpPr>
+          <p:cNvPr id="12" name="Freeform 11"/>
+          <p:cNvSpPr/>
+          <p:nvPr/>
+        </p:nvSpPr>
+        <p:spPr>
+          <a:xfrm>
+            <a:off x="2142150" y="1042975"/>
+            <a:ext cx="1080874" cy="482100"/>
+          </a:xfrm>
+          <a:custGeom>
+            <a:avLst/>
+            <a:gdLst>
+              <a:gd name="connsiteX0" fmla="*/ 540437 w 1080874"/>
+              <a:gd name="connsiteY0" fmla="*/ 0 h 971983"/>
+              <a:gd name="connsiteX1" fmla="*/ 1079174 w 1080874"/>
+              <a:gd name="connsiteY1" fmla="*/ 489883 h 971983"/>
+              <a:gd name="connsiteX2" fmla="*/ 1080874 w 1080874"/>
+              <a:gd name="connsiteY2" fmla="*/ 489883 h 971983"/>
+              <a:gd name="connsiteX3" fmla="*/ 1080874 w 1080874"/>
+              <a:gd name="connsiteY3" fmla="*/ 971983 h 971983"/>
+              <a:gd name="connsiteX4" fmla="*/ 1 w 1080874"/>
+              <a:gd name="connsiteY4" fmla="*/ 971983 h 971983"/>
+              <a:gd name="connsiteX5" fmla="*/ 1 w 1080874"/>
+              <a:gd name="connsiteY5" fmla="*/ 491428 h 971983"/>
+              <a:gd name="connsiteX6" fmla="*/ 0 w 1080874"/>
+              <a:gd name="connsiteY6" fmla="*/ 491428 h 971983"/>
+              <a:gd name="connsiteX7" fmla="*/ 1 w 1080874"/>
+              <a:gd name="connsiteY7" fmla="*/ 491427 h 971983"/>
+              <a:gd name="connsiteX8" fmla="*/ 1 w 1080874"/>
+              <a:gd name="connsiteY8" fmla="*/ 489883 h 971983"/>
+              <a:gd name="connsiteX9" fmla="*/ 1699 w 1080874"/>
+              <a:gd name="connsiteY9" fmla="*/ 489883 h 971983"/>
+            </a:gdLst>
+            <a:ahLst/>
+            <a:cxnLst>
+              <a:cxn ang="0">
+                <a:pos x="connsiteX0" y="connsiteY0"/>
+              </a:cxn>
+              <a:cxn ang="0">
+                <a:pos x="connsiteX1" y="connsiteY1"/>
+              </a:cxn>
+              <a:cxn ang="0">
+                <a:pos x="connsiteX2" y="connsiteY2"/>
+              </a:cxn>
+              <a:cxn ang="0">
+                <a:pos x="connsiteX3" y="connsiteY3"/>
+              </a:cxn>
+              <a:cxn ang="0">
+                <a:pos x="connsiteX4" y="connsiteY4"/>
+              </a:cxn>
+              <a:cxn ang="0">
+                <a:pos x="connsiteX5" y="connsiteY5"/>
+              </a:cxn>
+              <a:cxn ang="0">
+                <a:pos x="connsiteX6" y="connsiteY6"/>
+              </a:cxn>
+              <a:cxn ang="0">
+                <a:pos x="connsiteX7" y="connsiteY7"/>
+              </a:cxn>
+              <a:cxn ang="0">
+                <a:pos x="connsiteX8" y="connsiteY8"/>
+              </a:cxn>
+              <a:cxn ang="0">
+                <a:pos x="connsiteX9" y="connsiteY9"/>
+              </a:cxn>
+            </a:cxnLst>
+            <a:rect l="l" t="t" r="r" b="b"/>
+            <a:pathLst>
+              <a:path w="1080874" h="971983">
+                <a:moveTo>
+                  <a:pt x="540437" y="0"/>
+                </a:moveTo>
+                <a:lnTo>
+                  <a:pt x="1079174" y="489883"/>
+                </a:lnTo>
+                <a:lnTo>
+                  <a:pt x="1080874" y="489883"/>
+                </a:lnTo>
+                <a:lnTo>
+                  <a:pt x="1080874" y="971983"/>
+                </a:lnTo>
+                <a:lnTo>
+                  <a:pt x="1" y="971983"/>
+                </a:lnTo>
+                <a:lnTo>
+                  <a:pt x="1" y="491428"/>
+                </a:lnTo>
+                <a:lnTo>
+                  <a:pt x="0" y="491428"/>
+                </a:lnTo>
+                <a:lnTo>
+                  <a:pt x="1" y="491427"/>
+                </a:lnTo>
+                <a:lnTo>
+                  <a:pt x="1" y="489883"/>
+                </a:lnTo>
+                <a:lnTo>
+                  <a:pt x="1699" y="489883"/>
+                </a:lnTo>
+                <a:close/>
+              </a:path>
+            </a:pathLst>
+          </a:custGeom>
+          <a:solidFill>
+            <a:srgbClr val="FDD285"/>
+          </a:solidFill>
+          <a:ln>
+            <a:solidFill>
+              <a:schemeClr val="tx1"/>
+            </a:solidFill>
+          </a:ln>
+        </p:spPr>
+        <p:style>
+          <a:lnRef idx="2">
+            <a:schemeClr val="accent1">
+              <a:shade val="50000"/>
+            </a:schemeClr>
+          </a:lnRef>
+          <a:fillRef idx="1">
+            <a:schemeClr val="accent1"/>
+          </a:fillRef>
+          <a:effectRef idx="0">
+            <a:schemeClr val="accent1"/>
+          </a:effectRef>
+          <a:fontRef idx="minor">
+            <a:schemeClr val="lt1"/>
+          </a:fontRef>
+        </p:style>
+        <p:txBody>
+          <a:bodyPr rtlCol="0" anchor="ctr"/>
+          <a:lstStyle/>
+          <a:p>
+            <a:pPr algn="ctr"/>
+            <a:r>
+              <a:rPr lang="en-US" sz="1000" err="1">
+                <a:solidFill>
+                  <a:schemeClr val="tx1"/>
+                </a:solidFill>
+              </a:rPr>
+              <a:t>prov:Agent</a:t>
+            </a:r>
+            <a:endParaRPr lang="en-US" sz="1000">
+              <a:solidFill>
+                <a:schemeClr val="tx1"/>
+              </a:solidFill>
+            </a:endParaRPr>
+          </a:p>
+        </p:txBody>
+      </p:sp>
+      <p:sp>
+        <p:nvSpPr>
+          <p:cNvPr id="15" name="Text Box 34"/>
+          <p:cNvSpPr txBox="1"/>
+          <p:nvPr/>
+        </p:nvSpPr>
+        <p:spPr>
+          <a:xfrm>
+            <a:off x="5062492" y="0"/>
+            <a:ext cx="1292880" cy="257851"/>
+          </a:xfrm>
+          <a:prstGeom prst="rect">
+            <a:avLst/>
+          </a:prstGeom>
+          <a:noFill/>
+          <a:ln w="6350">
+            <a:noFill/>
+          </a:ln>
+        </p:spPr>
+        <p:txBody>
+          <a:bodyPr rot="0" spcFirstLastPara="0" vert="horz" wrap="none" lIns="91440" tIns="45720" rIns="91440" bIns="45720" numCol="1" spcCol="0" rtlCol="0" fromWordArt="0" anchor="t" anchorCtr="0" forceAA="0" compatLnSpc="1">
+            <a:prstTxWarp prst="textNoShape">
+              <a:avLst/>
+            </a:prstTxWarp>
+            <a:noAutofit/>
+          </a:bodyPr>
+          <a:lstStyle/>
+          <a:p>
+            <a:pPr algn="ctr">
+              <a:lnSpc>
+                <a:spcPct val="106000"/>
+              </a:lnSpc>
+              <a:spcAft>
+                <a:spcPts val="800"/>
+              </a:spcAft>
+            </a:pPr>
+            <a:r>
+              <a:rPr lang="en-AU" sz="1100" u="sng">
+                <a:effectLst/>
+                <a:latin typeface="Calibri" charset="0"/>
+                <a:ea typeface="Calibri" charset="0"/>
+              </a:rPr>
+              <a:t>Notation for IPAW ‘18 spatial paper</a:t>
+            </a:r>
+            <a:endParaRPr lang="en-GB" sz="1200">
+              <a:effectLst/>
+              <a:latin typeface="Times New Roman" charset="0"/>
+              <a:ea typeface="Times New Roman" charset="0"/>
+            </a:endParaRPr>
+          </a:p>
+        </p:txBody>
+      </p:sp>
+      <p:sp>
+        <p:nvSpPr>
+          <p:cNvPr id="42" name="Oval 41">
+            <a:extLst>
+              <a:ext uri="{FF2B5EF4-FFF2-40B4-BE49-F238E27FC236}">
+                <a16:creationId xmlns:a16="http://schemas.microsoft.com/office/drawing/2014/main" id="{B9DE7D49-E25F-9C41-A49A-90EE37831A51}"/>
+              </a:ext>
+            </a:extLst>
+          </p:cNvPr>
+          <p:cNvSpPr/>
+          <p:nvPr/>
+        </p:nvSpPr>
+        <p:spPr>
+          <a:xfrm>
+            <a:off x="4535718" y="1022063"/>
+            <a:ext cx="1234692" cy="523924"/>
+          </a:xfrm>
+          <a:prstGeom prst="ellipse">
+            <a:avLst/>
+          </a:prstGeom>
+          <a:solidFill>
+            <a:srgbClr val="F7D3F2"/>
+          </a:solidFill>
+          <a:ln>
+            <a:solidFill>
+              <a:srgbClr val="FF0000"/>
+            </a:solidFill>
+          </a:ln>
+        </p:spPr>
+        <p:style>
+          <a:lnRef idx="2">
+            <a:schemeClr val="accent1">
+              <a:shade val="50000"/>
+            </a:schemeClr>
+          </a:lnRef>
+          <a:fillRef idx="1">
+            <a:schemeClr val="accent1"/>
+          </a:fillRef>
+          <a:effectRef idx="0">
+            <a:schemeClr val="accent1"/>
+          </a:effectRef>
+          <a:fontRef idx="minor">
+            <a:schemeClr val="lt1"/>
+          </a:fontRef>
+        </p:style>
+        <p:txBody>
+          <a:bodyPr rtlCol="0" anchor="ctr"/>
+          <a:lstStyle/>
+          <a:p>
+            <a:pPr algn="ctr"/>
+            <a:r>
+              <a:rPr lang="en-US" sz="1000" err="1">
+                <a:solidFill>
+                  <a:schemeClr val="tx1"/>
+                </a:solidFill>
+              </a:rPr>
+              <a:t>Prov:Plan</a:t>
+            </a:r>
+            <a:endParaRPr lang="en-US" sz="1000">
+              <a:solidFill>
+                <a:schemeClr val="tx1"/>
+              </a:solidFill>
+            </a:endParaRPr>
+          </a:p>
+        </p:txBody>
+      </p:sp>
+      <p:sp>
+        <p:nvSpPr>
+          <p:cNvPr id="43" name="Rectangle 42">
+            <a:extLst>
+              <a:ext uri="{FF2B5EF4-FFF2-40B4-BE49-F238E27FC236}">
+                <a16:creationId xmlns:a16="http://schemas.microsoft.com/office/drawing/2014/main" id="{8D951A98-F0EB-3241-B962-FAE570302E42}"/>
+              </a:ext>
+            </a:extLst>
+          </p:cNvPr>
+          <p:cNvSpPr/>
+          <p:nvPr/>
+        </p:nvSpPr>
+        <p:spPr>
+          <a:xfrm>
+            <a:off x="5860545" y="1148385"/>
+            <a:ext cx="895855" cy="308434"/>
+          </a:xfrm>
+          <a:prstGeom prst="rect">
+            <a:avLst/>
+          </a:prstGeom>
+          <a:solidFill>
+            <a:srgbClr val="D9D9D9"/>
+          </a:solidFill>
+          <a:ln>
+            <a:solidFill>
+              <a:schemeClr val="tx1"/>
+            </a:solidFill>
+          </a:ln>
+        </p:spPr>
+        <p:style>
+          <a:lnRef idx="2">
+            <a:schemeClr val="accent1">
+              <a:shade val="50000"/>
+            </a:schemeClr>
+          </a:lnRef>
+          <a:fillRef idx="1">
+            <a:schemeClr val="accent1"/>
+          </a:fillRef>
+          <a:effectRef idx="0">
+            <a:schemeClr val="accent1"/>
+          </a:effectRef>
+          <a:fontRef idx="minor">
+            <a:schemeClr val="lt1"/>
+          </a:fontRef>
+        </p:style>
+        <p:txBody>
+          <a:bodyPr rtlCol="0" anchor="ctr"/>
+          <a:lstStyle/>
+          <a:p>
+            <a:pPr algn="ctr"/>
+            <a:r>
+              <a:rPr lang="en-US" sz="1000" err="1">
+                <a:solidFill>
+                  <a:schemeClr val="tx1"/>
+                </a:solidFill>
+              </a:rPr>
+              <a:t>xds:dateTime</a:t>
+            </a:r>
+            <a:endParaRPr lang="en-US" sz="1000">
+              <a:solidFill>
+                <a:schemeClr val="tx1"/>
+              </a:solidFill>
+            </a:endParaRPr>
+          </a:p>
+        </p:txBody>
+      </p:sp>
+      <p:sp>
+        <p:nvSpPr>
+          <p:cNvPr id="46" name="Oval 45">
+            <a:extLst>
+              <a:ext uri="{FF2B5EF4-FFF2-40B4-BE49-F238E27FC236}">
+                <a16:creationId xmlns:a16="http://schemas.microsoft.com/office/drawing/2014/main" id="{42533A60-BD99-7147-9BBC-BE9295C8A292}"/>
+              </a:ext>
+            </a:extLst>
+          </p:cNvPr>
+          <p:cNvSpPr/>
+          <p:nvPr/>
+        </p:nvSpPr>
+        <p:spPr>
+          <a:xfrm>
+            <a:off x="3335296" y="2046616"/>
+            <a:ext cx="1234692" cy="523924"/>
+          </a:xfrm>
+          <a:prstGeom prst="ellipse">
+            <a:avLst/>
+          </a:prstGeom>
+          <a:solidFill>
+            <a:srgbClr val="FF4432"/>
+          </a:solidFill>
+          <a:ln>
+            <a:solidFill>
+              <a:schemeClr val="bg1">
+                <a:lumMod val="50000"/>
+              </a:schemeClr>
+            </a:solidFill>
+          </a:ln>
+        </p:spPr>
+        <p:style>
+          <a:lnRef idx="2">
+            <a:schemeClr val="accent1">
+              <a:shade val="50000"/>
+            </a:schemeClr>
+          </a:lnRef>
+          <a:fillRef idx="1">
+            <a:schemeClr val="accent1"/>
+          </a:fillRef>
+          <a:effectRef idx="0">
+            <a:schemeClr val="accent1"/>
+          </a:effectRef>
+          <a:fontRef idx="minor">
+            <a:schemeClr val="lt1"/>
+          </a:fontRef>
+        </p:style>
+        <p:txBody>
+          <a:bodyPr rtlCol="0" anchor="ctr"/>
+          <a:lstStyle/>
+          <a:p>
+            <a:pPr algn="ctr"/>
+            <a:r>
+              <a:rPr lang="en-US" sz="1000" err="1">
+                <a:solidFill>
+                  <a:schemeClr val="tx1"/>
+                </a:solidFill>
+              </a:rPr>
+              <a:t>decprov: Requirement</a:t>
+            </a:r>
+            <a:endParaRPr lang="en-US" sz="1000">
+              <a:solidFill>
+                <a:schemeClr val="tx1"/>
+              </a:solidFill>
+            </a:endParaRPr>
+          </a:p>
+        </p:txBody>
+      </p:sp>
+      <p:sp>
+        <p:nvSpPr>
+          <p:cNvPr id="49" name="Oval 48">
+            <a:extLst>
+              <a:ext uri="{FF2B5EF4-FFF2-40B4-BE49-F238E27FC236}">
+                <a16:creationId xmlns:a16="http://schemas.microsoft.com/office/drawing/2014/main" id="{0310E1D4-FD48-184B-B284-25E2B849C898}"/>
+              </a:ext>
+            </a:extLst>
+          </p:cNvPr>
+          <p:cNvSpPr/>
+          <p:nvPr/>
+        </p:nvSpPr>
+        <p:spPr>
+          <a:xfrm>
+            <a:off x="795186" y="2046616"/>
+            <a:ext cx="1234692" cy="523924"/>
+          </a:xfrm>
+          <a:prstGeom prst="ellipse">
+            <a:avLst/>
+          </a:prstGeom>
+          <a:solidFill>
+            <a:srgbClr val="FFAA6F"/>
+          </a:solidFill>
+          <a:ln>
+            <a:solidFill>
+              <a:schemeClr val="bg1">
+                <a:lumMod val="50000"/>
+              </a:schemeClr>
+            </a:solidFill>
+          </a:ln>
+        </p:spPr>
+        <p:style>
+          <a:lnRef idx="2">
+            <a:schemeClr val="accent1">
+              <a:shade val="50000"/>
+            </a:schemeClr>
+          </a:lnRef>
+          <a:fillRef idx="1">
+            <a:schemeClr val="accent1"/>
+          </a:fillRef>
+          <a:effectRef idx="0">
+            <a:schemeClr val="accent1"/>
+          </a:effectRef>
+          <a:fontRef idx="minor">
+            <a:schemeClr val="lt1"/>
+          </a:fontRef>
+        </p:style>
+        <p:txBody>
+          <a:bodyPr rtlCol="0" anchor="ctr"/>
+          <a:lstStyle/>
+          <a:p>
+            <a:pPr algn="ctr"/>
+            <a:r>
+              <a:rPr lang="en-US" sz="1000" err="1">
+                <a:solidFill>
+                  <a:schemeClr val="tx1"/>
+                </a:solidFill>
+              </a:rPr>
+              <a:t>decprov:</a:t>
+            </a:r>
+          </a:p>
+          <a:p>
+            <a:pPr algn="ctr"/>
+            <a:r>
+              <a:rPr lang="en-US" sz="1000" err="1">
+                <a:solidFill>
+                  <a:schemeClr val="tx1"/>
+                </a:solidFill>
+              </a:rPr>
+              <a:t>Question</a:t>
+            </a:r>
+            <a:endParaRPr lang="en-US" sz="1000">
+              <a:solidFill>
+                <a:schemeClr val="tx1"/>
+              </a:solidFill>
+            </a:endParaRPr>
+          </a:p>
+        </p:txBody>
+      </p:sp>
+      <p:sp>
+        <p:nvSpPr>
+          <p:cNvPr id="52" name="Oval 51">
+            <a:extLst>
+              <a:ext uri="{FF2B5EF4-FFF2-40B4-BE49-F238E27FC236}">
+                <a16:creationId xmlns:a16="http://schemas.microsoft.com/office/drawing/2014/main" id="{F5AA5999-F420-FA42-9045-52786B9E357B}"/>
+              </a:ext>
+            </a:extLst>
+          </p:cNvPr>
+          <p:cNvSpPr/>
+          <p:nvPr/>
+        </p:nvSpPr>
+        <p:spPr>
+          <a:xfrm>
+            <a:off x="2065241" y="2046616"/>
+            <a:ext cx="1234692" cy="523924"/>
+          </a:xfrm>
+          <a:prstGeom prst="ellipse">
+            <a:avLst/>
+          </a:prstGeom>
+          <a:solidFill>
+            <a:srgbClr val="FF6E3C"/>
+          </a:solidFill>
+          <a:ln>
+            <a:solidFill>
+              <a:schemeClr val="bg1">
+                <a:lumMod val="50000"/>
+              </a:schemeClr>
+            </a:solidFill>
+          </a:ln>
+        </p:spPr>
+        <p:style>
+          <a:lnRef idx="2">
+            <a:schemeClr val="accent1">
+              <a:shade val="50000"/>
+            </a:schemeClr>
+          </a:lnRef>
+          <a:fillRef idx="1">
+            <a:schemeClr val="accent1"/>
+          </a:fillRef>
+          <a:effectRef idx="0">
+            <a:schemeClr val="accent1"/>
+          </a:effectRef>
+          <a:fontRef idx="minor">
+            <a:schemeClr val="lt1"/>
+          </a:fontRef>
+        </p:style>
+        <p:txBody>
+          <a:bodyPr rtlCol="0" anchor="ctr"/>
+          <a:lstStyle/>
+          <a:p>
+            <a:pPr algn="ctr"/>
+            <a:r>
+              <a:rPr lang="en-US" sz="1000" err="1">
+                <a:solidFill>
+                  <a:schemeClr val="tx1"/>
+                </a:solidFill>
+              </a:rPr>
+              <a:t>decprov: Answer</a:t>
+            </a:r>
+            <a:endParaRPr lang="en-US" sz="1000">
+              <a:solidFill>
+                <a:schemeClr val="tx1"/>
+              </a:solidFill>
+            </a:endParaRPr>
+          </a:p>
+        </p:txBody>
+      </p:sp>
+      <p:sp>
+        <p:nvSpPr>
+          <p:cNvPr id="54" name="Rectangle 53">
+            <a:extLst>
+              <a:ext uri="{FF2B5EF4-FFF2-40B4-BE49-F238E27FC236}">
+                <a16:creationId xmlns:a16="http://schemas.microsoft.com/office/drawing/2014/main" id="{884DC893-E965-FE43-A11E-18E486094092}"/>
+              </a:ext>
+            </a:extLst>
+          </p:cNvPr>
+          <p:cNvSpPr/>
+          <p:nvPr/>
+        </p:nvSpPr>
+        <p:spPr>
+          <a:xfrm>
+            <a:off x="4628059" y="2088440"/>
+            <a:ext cx="1080873" cy="482100"/>
+          </a:xfrm>
+          <a:prstGeom prst="rect">
+            <a:avLst/>
+          </a:prstGeom>
+          <a:solidFill>
+            <a:srgbClr val="C495FF"/>
+          </a:solidFill>
+          <a:ln>
+            <a:solidFill>
+              <a:schemeClr val="bg1">
+                <a:lumMod val="50000"/>
+              </a:schemeClr>
+            </a:solidFill>
+          </a:ln>
+        </p:spPr>
+        <p:style>
+          <a:lnRef idx="2">
+            <a:schemeClr val="accent1">
+              <a:shade val="50000"/>
+            </a:schemeClr>
+          </a:lnRef>
+          <a:fillRef idx="1">
+            <a:schemeClr val="accent1"/>
+          </a:fillRef>
+          <a:effectRef idx="0">
+            <a:schemeClr val="accent1"/>
+          </a:effectRef>
+          <a:fontRef idx="minor">
+            <a:schemeClr val="lt1"/>
+          </a:fontRef>
+        </p:style>
+        <p:txBody>
+          <a:bodyPr rtlCol="0" anchor="ctr"/>
+          <a:lstStyle/>
+          <a:p>
+            <a:pPr algn="ctr"/>
+            <a:r>
+              <a:rPr lang="en-US" sz="1000" err="1">
+                <a:solidFill>
+                  <a:schemeClr val="tx1"/>
+                </a:solidFill>
+              </a:rPr>
+              <a:t>decprov: DecisionMaking</a:t>
+            </a:r>
+            <a:endParaRPr lang="en-US" sz="1000">
+              <a:solidFill>
+                <a:schemeClr val="tx1"/>
+              </a:solidFill>
+            </a:endParaRPr>
+          </a:p>
+        </p:txBody>
+      </p:sp>
+      <p:sp>
+        <p:nvSpPr>
+          <p:cNvPr id="57" name="Rectangle 56">
+            <a:extLst>
+              <a:ext uri="{FF2B5EF4-FFF2-40B4-BE49-F238E27FC236}">
+                <a16:creationId xmlns:a16="http://schemas.microsoft.com/office/drawing/2014/main" id="{5F2BB5C6-A152-B842-8826-E0011D5BF18A}"/>
+              </a:ext>
+            </a:extLst>
+          </p:cNvPr>
+          <p:cNvSpPr/>
+          <p:nvPr/>
+        </p:nvSpPr>
+        <p:spPr>
+          <a:xfrm>
+            <a:off x="5860545" y="2088440"/>
+            <a:ext cx="1080873" cy="482100"/>
+          </a:xfrm>
+          <a:prstGeom prst="rect">
+            <a:avLst/>
+          </a:prstGeom>
+          <a:solidFill>
+            <a:srgbClr val="C42BFF"/>
+          </a:solidFill>
+          <a:ln>
+            <a:solidFill>
+              <a:schemeClr val="bg1">
+                <a:lumMod val="50000"/>
+              </a:schemeClr>
+            </a:solidFill>
+          </a:ln>
+        </p:spPr>
+        <p:style>
+          <a:lnRef idx="2">
+            <a:schemeClr val="accent1">
+              <a:shade val="50000"/>
+            </a:schemeClr>
+          </a:lnRef>
+          <a:fillRef idx="1">
+            <a:schemeClr val="accent1"/>
+          </a:fillRef>
+          <a:effectRef idx="0">
+            <a:schemeClr val="accent1"/>
+          </a:effectRef>
+          <a:fontRef idx="minor">
+            <a:schemeClr val="lt1"/>
+          </a:fontRef>
+        </p:style>
+        <p:txBody>
+          <a:bodyPr rtlCol="0" anchor="ctr"/>
+          <a:lstStyle/>
+          <a:p>
+            <a:pPr algn="ctr"/>
+            <a:r>
+              <a:rPr lang="en-US" sz="1000" err="1">
+                <a:solidFill>
+                  <a:schemeClr val="tx1"/>
+                </a:solidFill>
+              </a:rPr>
+              <a:t>decprov: OptionSelection</a:t>
+            </a:r>
+            <a:endParaRPr lang="en-US" sz="1000">
+              <a:solidFill>
+                <a:schemeClr val="tx1"/>
+              </a:solidFill>
+            </a:endParaRPr>
+          </a:p>
+        </p:txBody>
+      </p:sp>
+      <p:sp>
+        <p:nvSpPr>
+          <p:cNvPr id="2" name="TextBox 1">
+            <a:extLst>
+              <a:ext uri="{FF2B5EF4-FFF2-40B4-BE49-F238E27FC236}">
+                <a16:creationId xmlns:a16="http://schemas.microsoft.com/office/drawing/2014/main" id="{39B57582-D1ED-B94D-9E3E-489925271610}"/>
+              </a:ext>
+            </a:extLst>
+          </p:cNvPr>
+          <p:cNvSpPr txBox="1"/>
+          <p:nvPr/>
+        </p:nvSpPr>
+        <p:spPr>
+          <a:xfrm>
+            <a:off x="7075828" y="898816"/>
+            <a:ext cx="4339393" cy="1815882"/>
+          </a:xfrm>
+          <a:prstGeom prst="rect">
+            <a:avLst/>
+          </a:prstGeom>
+          <a:noFill/>
+        </p:spPr>
+        <p:txBody>
+          <a:bodyPr wrap="none" rtlCol="0">
+            <a:spAutoFit/>
+          </a:bodyPr>
+          <a:lstStyle/>
+          <a:p>
+            <a:r>
+              <a:rPr lang="en-US" sz="1400"/>
+              <a:t>geo:	http://www.opengis.net/ont/geosparql#</a:t>
+            </a:r>
+            <a:br>
+              <a:rPr lang="en-US" sz="1400"/>
+            </a:br>
+            <a:r>
+              <a:rPr lang="en-US" sz="1400"/>
+              <a:t>ga:	http://www.example.org/dataset/hotspots/</a:t>
+            </a:r>
+          </a:p>
+          <a:p>
+            <a:r>
+              <a:rPr lang="en-US" sz="1400"/>
+              <a:t>bld:	http://www.example.org/dataset/buildings/</a:t>
+            </a:r>
+          </a:p>
+          <a:p>
+            <a:r>
+              <a:rPr lang="en-US" sz="1400"/>
+              <a:t>gov:	http://linked.data.gov.au/org/au/</a:t>
+            </a:r>
+          </a:p>
+          <a:p>
+            <a:r>
+              <a:rPr lang="en-US" sz="1400"/>
+              <a:t>sparql:	http://www.w3.org/ns/sparql#</a:t>
+            </a:r>
+          </a:p>
+          <a:p>
+            <a:r>
+              <a:rPr lang="en-US" sz="1400"/>
+              <a:t>ex:	http://www.wxample.org/ex/</a:t>
+            </a:r>
+          </a:p>
+          <a:p>
+            <a:r>
+              <a:rPr lang="en-US" sz="1400"/>
+              <a:t>prov:	http://www.w3.org/ns/prov#</a:t>
+            </a:r>
+          </a:p>
+          <a:p>
+            <a:r>
+              <a:rPr lang="en-US" sz="1400"/>
+              <a:t>decprov :	http://promsns.org/def/decprov#</a:t>
+            </a:r>
+          </a:p>
+        </p:txBody>
+      </p:sp>
+      <p:sp>
+        <p:nvSpPr>
+          <p:cNvPr id="3" name="Rectangle 2">
+            <a:extLst>
+              <a:ext uri="{FF2B5EF4-FFF2-40B4-BE49-F238E27FC236}">
+                <a16:creationId xmlns:a16="http://schemas.microsoft.com/office/drawing/2014/main" id="{87D5FE5D-E126-B449-9351-332F66AE1772}"/>
+              </a:ext>
+            </a:extLst>
+          </p:cNvPr>
+          <p:cNvSpPr/>
+          <p:nvPr/>
+        </p:nvSpPr>
+        <p:spPr>
+          <a:xfrm>
+            <a:off x="694320" y="576627"/>
+            <a:ext cx="2315249" cy="369332"/>
+          </a:xfrm>
+          <a:prstGeom prst="rect">
+            <a:avLst/>
+          </a:prstGeom>
+        </p:spPr>
+        <p:txBody>
+          <a:bodyPr wrap="none">
+            <a:spAutoFit/>
+          </a:bodyPr>
+          <a:lstStyle/>
+          <a:p>
+            <a:r>
+              <a:rPr lang="en-US" u="sng"/>
+              <a:t>PROV Ontology classes</a:t>
+            </a:r>
+          </a:p>
+        </p:txBody>
+      </p:sp>
+      <p:sp>
+        <p:nvSpPr>
+          <p:cNvPr id="58" name="Rectangle 57">
+            <a:extLst>
+              <a:ext uri="{FF2B5EF4-FFF2-40B4-BE49-F238E27FC236}">
+                <a16:creationId xmlns:a16="http://schemas.microsoft.com/office/drawing/2014/main" id="{F02C1FB0-07C7-1247-999F-754760A6F176}"/>
+              </a:ext>
+            </a:extLst>
+          </p:cNvPr>
+          <p:cNvSpPr/>
+          <p:nvPr/>
+        </p:nvSpPr>
+        <p:spPr>
+          <a:xfrm>
+            <a:off x="694320" y="1622091"/>
+            <a:ext cx="2671116" cy="369332"/>
+          </a:xfrm>
+          <a:prstGeom prst="rect">
+            <a:avLst/>
+          </a:prstGeom>
+        </p:spPr>
+        <p:txBody>
+          <a:bodyPr wrap="none">
+            <a:spAutoFit/>
+          </a:bodyPr>
+          <a:lstStyle/>
+          <a:p>
+            <a:r>
+              <a:rPr lang="en-US" u="sng"/>
+              <a:t>DecPROV Ontology classes</a:t>
+            </a:r>
+          </a:p>
+        </p:txBody>
+      </p:sp>
+      <p:sp>
+        <p:nvSpPr>
+          <p:cNvPr id="16" name="Rectangle 15">
+            <a:extLst>
+              <a:ext uri="{FF2B5EF4-FFF2-40B4-BE49-F238E27FC236}">
+                <a16:creationId xmlns:a16="http://schemas.microsoft.com/office/drawing/2014/main" id="{0CB6F522-2BB4-CC43-B089-52AF23955CDA}"/>
+              </a:ext>
+            </a:extLst>
+          </p:cNvPr>
+          <p:cNvSpPr/>
+          <p:nvPr/>
+        </p:nvSpPr>
+        <p:spPr>
+          <a:xfrm>
+            <a:off x="7075828" y="576627"/>
+            <a:ext cx="2066656" cy="369332"/>
+          </a:xfrm>
+          <a:prstGeom prst="rect">
+            <a:avLst/>
+          </a:prstGeom>
+        </p:spPr>
+        <p:txBody>
+          <a:bodyPr wrap="none">
+            <a:spAutoFit/>
+          </a:bodyPr>
+          <a:lstStyle/>
+          <a:p>
+            <a:r>
+              <a:rPr lang="en-US" u="sng"/>
+              <a:t>Namespace prefixes</a:t>
+            </a:r>
+          </a:p>
+        </p:txBody>
+      </p:sp>
+    </p:spTree>
+    <p:extLst>
+      <p:ext uri="{BB962C8B-B14F-4D97-AF65-F5344CB8AC3E}">
+        <p14:creationId xmlns:p14="http://schemas.microsoft.com/office/powerpoint/2010/main" val="420670072"/>
       </p:ext>
     </p:extLst>
   </p:cSld>
@@ -36289,7 +37004,7 @@
               </a:spcAft>
             </a:pPr>
             <a:r>
-              <a:rPr lang="en-AU" sz="800" err="1" smtClean="0">
+              <a:rPr lang="en-AU" sz="800" err="1">
                 <a:effectLst/>
                 <a:latin typeface="Calibri" charset="0"/>
                 <a:ea typeface="Calibri" charset="0"/>
@@ -36351,7 +37066,7 @@
           <a:p>
             <a:pPr algn="ctr"/>
             <a:r>
-              <a:rPr lang="en-US" sz="1000" err="1" smtClean="0">
+              <a:rPr lang="en-US" sz="1000" err="1">
                 <a:solidFill>
                   <a:schemeClr val="tx1"/>
                 </a:solidFill>
@@ -36413,7 +37128,7 @@
           <a:p>
             <a:pPr algn="ctr"/>
             <a:r>
-              <a:rPr lang="en-US" sz="1000" err="1" smtClean="0">
+              <a:rPr lang="en-US" sz="1000" err="1">
                 <a:solidFill>
                   <a:schemeClr val="tx1"/>
                 </a:solidFill>
@@ -36527,7 +37242,7 @@
           <a:p>
             <a:pPr algn="ctr"/>
             <a:r>
-              <a:rPr lang="en-AU" sz="1000" smtClean="0">
+              <a:rPr lang="en-AU" sz="1000">
                 <a:solidFill>
                   <a:schemeClr val="tx1"/>
                 </a:solidFill>
@@ -36680,7 +37395,7 @@
           <a:p>
             <a:pPr algn="ctr"/>
             <a:r>
-              <a:rPr lang="en-US" sz="1000" err="1" smtClean="0">
+              <a:rPr lang="en-US" sz="1000" err="1">
                 <a:solidFill>
                   <a:schemeClr val="tx1"/>
                 </a:solidFill>
@@ -37022,7 +37737,7 @@
               </a:spcAft>
             </a:pPr>
             <a:r>
-              <a:rPr lang="en-AU" sz="1000" smtClean="0">
+              <a:rPr lang="en-AU" sz="1000">
                 <a:effectLst/>
                 <a:ea typeface="Calibri" charset="0"/>
                 <a:cs typeface="Calibri" charset="0"/>
@@ -37099,7 +37814,7 @@
               </a:spcAft>
             </a:pPr>
             <a:r>
-              <a:rPr lang="en-AU" sz="1000" smtClean="0">
+              <a:rPr lang="en-AU" sz="1000">
                 <a:effectLst/>
                 <a:ea typeface="Calibri" charset="0"/>
                 <a:cs typeface="Calibri" charset="0"/>
@@ -37302,7 +38017,7 @@
           <a:p>
             <a:pPr algn="ctr"/>
             <a:r>
-              <a:rPr lang="en-US" sz="1000" err="1" smtClean="0">
+              <a:rPr lang="en-US" sz="1000" err="1">
                 <a:solidFill>
                   <a:schemeClr val="tx1"/>
                 </a:solidFill>
@@ -37364,7 +38079,7 @@
           <a:p>
             <a:pPr algn="ctr"/>
             <a:r>
-              <a:rPr lang="en-US" sz="1000" err="1" smtClean="0">
+              <a:rPr lang="en-US" sz="1000" err="1">
                 <a:solidFill>
                   <a:schemeClr val="tx1"/>
                 </a:solidFill>
@@ -37426,7 +38141,7 @@
           <a:p>
             <a:pPr algn="ctr"/>
             <a:r>
-              <a:rPr lang="en-AU" sz="1000" smtClean="0">
+              <a:rPr lang="en-AU" sz="1000">
                 <a:solidFill>
                   <a:schemeClr val="tx1"/>
                 </a:solidFill>
@@ -37774,7 +38489,7 @@
           <a:p>
             <a:pPr algn="ctr"/>
             <a:r>
-              <a:rPr lang="en-US" sz="1000" err="1" smtClean="0">
+              <a:rPr lang="en-US" sz="1000" err="1">
                 <a:solidFill>
                   <a:schemeClr val="tx1"/>
                 </a:solidFill>
@@ -37950,7 +38665,7 @@
               </a:spcAft>
             </a:pPr>
             <a:r>
-              <a:rPr lang="en-AU" sz="800" smtClean="0">
+              <a:rPr lang="en-AU" sz="800">
                 <a:effectLst/>
                 <a:latin typeface="Calibri" charset="0"/>
                 <a:ea typeface="Calibri" charset="0"/>
@@ -38002,7 +38717,7 @@
               </a:spcAft>
             </a:pPr>
             <a:r>
-              <a:rPr lang="en-AU" sz="800" smtClean="0">
+              <a:rPr lang="en-AU" sz="800">
                 <a:effectLst/>
                 <a:latin typeface="Calibri" charset="0"/>
                 <a:ea typeface="Calibri" charset="0"/>
@@ -38054,7 +38769,7 @@
               </a:spcAft>
             </a:pPr>
             <a:r>
-              <a:rPr lang="en-AU" sz="800" smtClean="0">
+              <a:rPr lang="en-AU" sz="800">
                 <a:effectLst/>
                 <a:latin typeface="Calibri" charset="0"/>
                 <a:ea typeface="Calibri" charset="0"/>
@@ -38106,7 +38821,7 @@
               </a:spcAft>
             </a:pPr>
             <a:r>
-              <a:rPr lang="en-AU" sz="800" smtClean="0">
+              <a:rPr lang="en-AU" sz="800">
                 <a:effectLst/>
                 <a:latin typeface="Calibri" charset="0"/>
                 <a:ea typeface="Calibri" charset="0"/>
@@ -38158,7 +38873,7 @@
               </a:spcAft>
             </a:pPr>
             <a:r>
-              <a:rPr lang="en-AU" sz="800" smtClean="0">
+              <a:rPr lang="en-AU" sz="800">
                 <a:effectLst/>
                 <a:latin typeface="Calibri" charset="0"/>
                 <a:ea typeface="Calibri" charset="0"/>
@@ -38210,7 +38925,7 @@
               </a:spcAft>
             </a:pPr>
             <a:r>
-              <a:rPr lang="en-AU" sz="800" smtClean="0">
+              <a:rPr lang="en-AU" sz="800">
                 <a:effectLst/>
                 <a:latin typeface="Calibri" charset="0"/>
                 <a:ea typeface="Calibri" charset="0"/>
@@ -38262,7 +38977,7 @@
               </a:spcAft>
             </a:pPr>
             <a:r>
-              <a:rPr lang="en-AU" sz="800" smtClean="0">
+              <a:rPr lang="en-AU" sz="800">
                 <a:effectLst/>
                 <a:latin typeface="Calibri" charset="0"/>
                 <a:ea typeface="Calibri" charset="0"/>
@@ -38324,7 +39039,7 @@
           <a:p>
             <a:pPr algn="ctr"/>
             <a:r>
-              <a:rPr lang="en-US" sz="1000" err="1" smtClean="0">
+              <a:rPr lang="en-US" sz="1000" err="1">
                 <a:solidFill>
                   <a:schemeClr val="tx1"/>
                 </a:solidFill>
@@ -38386,7 +39101,7 @@
           <a:p>
             <a:pPr algn="ctr"/>
             <a:r>
-              <a:rPr lang="en-US" sz="1000" err="1" smtClean="0">
+              <a:rPr lang="en-US" sz="1000" err="1">
                 <a:solidFill>
                   <a:schemeClr val="tx1"/>
                 </a:solidFill>
@@ -38696,7 +39411,7 @@
           <a:p>
             <a:pPr algn="ctr"/>
             <a:r>
-              <a:rPr lang="en-US" sz="1000" err="1" smtClean="0">
+              <a:rPr lang="en-US" sz="1000" err="1">
                 <a:solidFill>
                   <a:schemeClr val="tx1"/>
                 </a:solidFill>
@@ -38869,7 +39584,7 @@
               </a:spcAft>
             </a:pPr>
             <a:r>
-              <a:rPr lang="en-AU" sz="900" smtClean="0">
+              <a:rPr lang="en-AU" sz="900">
                 <a:effectLst/>
                 <a:latin typeface="Calibri" charset="0"/>
                 <a:ea typeface="Calibri" charset="0"/>
@@ -38921,7 +39636,7 @@
               </a:spcAft>
             </a:pPr>
             <a:r>
-              <a:rPr lang="en-AU" sz="900" smtClean="0">
+              <a:rPr lang="en-AU" sz="900">
                 <a:effectLst/>
                 <a:latin typeface="Calibri" charset="0"/>
                 <a:ea typeface="Calibri" charset="0"/>
@@ -38973,7 +39688,7 @@
               </a:spcAft>
             </a:pPr>
             <a:r>
-              <a:rPr lang="en-AU" sz="900" smtClean="0">
+              <a:rPr lang="en-AU" sz="900">
                 <a:effectLst/>
                 <a:latin typeface="Calibri" charset="0"/>
                 <a:ea typeface="Calibri" charset="0"/>
@@ -39025,7 +39740,7 @@
               </a:spcAft>
             </a:pPr>
             <a:r>
-              <a:rPr lang="en-AU" sz="900" smtClean="0">
+              <a:rPr lang="en-AU" sz="900">
                 <a:effectLst/>
                 <a:latin typeface="Calibri" charset="0"/>
                 <a:ea typeface="Calibri" charset="0"/>
@@ -39077,7 +39792,7 @@
               </a:spcAft>
             </a:pPr>
             <a:r>
-              <a:rPr lang="en-AU" sz="900" smtClean="0">
+              <a:rPr lang="en-AU" sz="900">
                 <a:effectLst/>
                 <a:latin typeface="Calibri" charset="0"/>
                 <a:ea typeface="Calibri" charset="0"/>
@@ -39129,7 +39844,7 @@
               </a:spcAft>
             </a:pPr>
             <a:r>
-              <a:rPr lang="en-AU" sz="900" smtClean="0">
+              <a:rPr lang="en-AU" sz="900">
                 <a:effectLst/>
                 <a:latin typeface="Calibri" charset="0"/>
                 <a:ea typeface="Calibri" charset="0"/>
@@ -39181,7 +39896,7 @@
               </a:spcAft>
             </a:pPr>
             <a:r>
-              <a:rPr lang="en-AU" sz="900" smtClean="0">
+              <a:rPr lang="en-AU" sz="900">
                 <a:effectLst/>
                 <a:latin typeface="Calibri" charset="0"/>
                 <a:ea typeface="Calibri" charset="0"/>
@@ -39376,7 +40091,7 @@
               </a:spcAft>
             </a:pPr>
             <a:r>
-              <a:rPr lang="en-AU" sz="800" err="1" smtClean="0">
+              <a:rPr lang="en-AU" sz="800" err="1">
                 <a:effectLst/>
                 <a:latin typeface="Calibri" charset="0"/>
                 <a:ea typeface="Calibri" charset="0"/>
@@ -39438,7 +40153,7 @@
           <a:p>
             <a:pPr algn="ctr"/>
             <a:r>
-              <a:rPr lang="en-US" sz="1000" err="1" smtClean="0">
+              <a:rPr lang="en-US" sz="1000" err="1">
                 <a:solidFill>
                   <a:schemeClr val="tx1"/>
                 </a:solidFill>
@@ -39500,7 +40215,7 @@
           <a:p>
             <a:pPr algn="ctr"/>
             <a:r>
-              <a:rPr lang="en-US" sz="1000" err="1" smtClean="0">
+              <a:rPr lang="en-US" sz="1000" err="1">
                 <a:solidFill>
                   <a:schemeClr val="tx1"/>
                 </a:solidFill>
@@ -39614,7 +40329,7 @@
           <a:p>
             <a:pPr algn="ctr"/>
             <a:r>
-              <a:rPr lang="en-AU" sz="1000" smtClean="0">
+              <a:rPr lang="en-AU" sz="1000">
                 <a:solidFill>
                   <a:schemeClr val="tx1"/>
                 </a:solidFill>
@@ -39767,7 +40482,7 @@
           <a:p>
             <a:pPr algn="ctr"/>
             <a:r>
-              <a:rPr lang="en-US" sz="1000" err="1" smtClean="0">
+              <a:rPr lang="en-US" sz="1000" err="1">
                 <a:solidFill>
                   <a:schemeClr val="tx1"/>
                 </a:solidFill>
@@ -40109,7 +40824,7 @@
               </a:spcAft>
             </a:pPr>
             <a:r>
-              <a:rPr lang="en-AU" sz="1000" smtClean="0">
+              <a:rPr lang="en-AU" sz="1000">
                 <a:effectLst/>
                 <a:ea typeface="Calibri" charset="0"/>
                 <a:cs typeface="Calibri" charset="0"/>
@@ -40186,7 +40901,7 @@
               </a:spcAft>
             </a:pPr>
             <a:r>
-              <a:rPr lang="en-AU" sz="1000" smtClean="0">
+              <a:rPr lang="en-AU" sz="1000">
                 <a:effectLst/>
                 <a:ea typeface="Calibri" charset="0"/>
                 <a:cs typeface="Calibri" charset="0"/>
@@ -40389,7 +41104,7 @@
           <a:p>
             <a:pPr algn="ctr"/>
             <a:r>
-              <a:rPr lang="en-US" sz="1000" err="1" smtClean="0">
+              <a:rPr lang="en-US" sz="1000" err="1">
                 <a:solidFill>
                   <a:schemeClr val="tx1"/>
                 </a:solidFill>
@@ -40451,7 +41166,7 @@
           <a:p>
             <a:pPr algn="ctr"/>
             <a:r>
-              <a:rPr lang="en-US" sz="1000" err="1" smtClean="0">
+              <a:rPr lang="en-US" sz="1000" err="1">
                 <a:solidFill>
                   <a:schemeClr val="tx1"/>
                 </a:solidFill>
@@ -40761,7 +41476,7 @@
           <a:p>
             <a:pPr algn="ctr"/>
             <a:r>
-              <a:rPr lang="en-US" sz="1000" err="1" smtClean="0">
+              <a:rPr lang="en-US" sz="1000" err="1">
                 <a:solidFill>
                   <a:schemeClr val="tx1"/>
                 </a:solidFill>
@@ -40936,7 +41651,7 @@
               </a:spcAft>
             </a:pPr>
             <a:r>
-              <a:rPr lang="en-AU" sz="900" smtClean="0">
+              <a:rPr lang="en-AU" sz="900">
                 <a:effectLst/>
                 <a:latin typeface="Calibri" charset="0"/>
                 <a:ea typeface="Calibri" charset="0"/>
@@ -40988,7 +41703,7 @@
               </a:spcAft>
             </a:pPr>
             <a:r>
-              <a:rPr lang="en-AU" sz="900" smtClean="0">
+              <a:rPr lang="en-AU" sz="900">
                 <a:effectLst/>
                 <a:latin typeface="Calibri" charset="0"/>
                 <a:ea typeface="Calibri" charset="0"/>
@@ -41040,7 +41755,7 @@
               </a:spcAft>
             </a:pPr>
             <a:r>
-              <a:rPr lang="en-AU" sz="900" smtClean="0">
+              <a:rPr lang="en-AU" sz="900">
                 <a:effectLst/>
                 <a:latin typeface="Calibri" charset="0"/>
                 <a:ea typeface="Calibri" charset="0"/>
@@ -41092,7 +41807,7 @@
               </a:spcAft>
             </a:pPr>
             <a:r>
-              <a:rPr lang="en-AU" sz="900" smtClean="0">
+              <a:rPr lang="en-AU" sz="900">
                 <a:effectLst/>
                 <a:latin typeface="Calibri" charset="0"/>
                 <a:ea typeface="Calibri" charset="0"/>
@@ -41146,7 +41861,7 @@
               </a:spcAft>
             </a:pPr>
             <a:r>
-              <a:rPr lang="en-AU" sz="900" smtClean="0">
+              <a:rPr lang="en-AU" sz="900">
                 <a:effectLst/>
                 <a:latin typeface="Calibri" charset="0"/>
                 <a:ea typeface="Calibri" charset="0"/>
@@ -41198,7 +41913,7 @@
               </a:spcAft>
             </a:pPr>
             <a:r>
-              <a:rPr lang="en-AU" sz="900" smtClean="0">
+              <a:rPr lang="en-AU" sz="900">
                 <a:effectLst/>
                 <a:latin typeface="Calibri" charset="0"/>
                 <a:ea typeface="Calibri" charset="0"/>
@@ -42720,7 +43435,7 @@
               </a:spcAft>
             </a:pPr>
             <a:r>
-              <a:rPr lang="en-AU" sz="1000" smtClean="0">
+              <a:rPr lang="en-AU" sz="1000">
                 <a:effectLst/>
                 <a:ea typeface="Calibri" charset="0"/>
                 <a:cs typeface="Calibri" charset="0"/>
@@ -42797,7 +43512,7 @@
               </a:spcAft>
             </a:pPr>
             <a:r>
-              <a:rPr lang="en-AU" sz="1000" smtClean="0">
+              <a:rPr lang="en-AU" sz="1000">
                 <a:effectLst/>
                 <a:ea typeface="Calibri" charset="0"/>
                 <a:cs typeface="Calibri" charset="0"/>
@@ -42934,7 +43649,7 @@
               <a:t>is</a:t>
             </a:r>
             <a:r>
-              <a:rPr lang="en-AU" sz="800" smtClean="0">
+              <a:rPr lang="en-AU" sz="800">
                 <a:effectLst/>
                 <a:latin typeface="Calibri" charset="0"/>
                 <a:ea typeface="Calibri" charset="0"/>
@@ -42986,7 +43701,7 @@
               </a:spcAft>
             </a:pPr>
             <a:r>
-              <a:rPr lang="en-AU" sz="800" smtClean="0">
+              <a:rPr lang="en-AU" sz="800">
                 <a:effectLst/>
                 <a:latin typeface="Calibri" charset="0"/>
                 <a:ea typeface="Calibri" charset="0"/>
@@ -43047,7 +43762,7 @@
               <a:t>is</a:t>
             </a:r>
             <a:r>
-              <a:rPr lang="en-AU" sz="800" smtClean="0">
+              <a:rPr lang="en-AU" sz="800">
                 <a:effectLst/>
                 <a:latin typeface="Calibri" charset="0"/>
                 <a:ea typeface="Calibri" charset="0"/>
@@ -43381,23 +44096,7 @@
                 <a:ea typeface="Calibri" charset="0"/>
                 <a:cs typeface="Calibri" charset="0"/>
               </a:rPr>
-              <a:t>No </a:t>
-            </a:r>
-            <a:r>
-              <a:rPr lang="en-AU" sz="800" smtClean="0">
-                <a:effectLst/>
-                <a:ea typeface="Calibri" charset="0"/>
-                <a:cs typeface="Calibri" charset="0"/>
-              </a:rPr>
-              <a:t>amoxicillin </a:t>
-            </a:r>
-            <a:r>
-              <a:rPr lang="en-AU" sz="800">
-                <a:effectLst/>
-                <a:ea typeface="Calibri" charset="0"/>
-                <a:cs typeface="Calibri" charset="0"/>
-              </a:rPr>
-              <a:t>allergy</a:t>
+              <a:t>No amoxicillin allergy</a:t>
             </a:r>
             <a:endParaRPr lang="en-GB" sz="1200">
               <a:effectLst/>
@@ -43466,7 +44165,7 @@
               <a:t>Patient not allergic to </a:t>
             </a:r>
             <a:r>
-              <a:rPr lang="en-AU" sz="800" err="1" smtClean="0">
+              <a:rPr lang="en-AU" sz="800" err="1">
                 <a:effectLst/>
                 <a:ea typeface="Calibri" charset="0"/>
                 <a:cs typeface="Calibri" charset="0"/>
@@ -43543,15 +44242,7 @@
                 <a:ea typeface="Calibri" charset="0"/>
                 <a:cs typeface="Calibri" charset="0"/>
               </a:rPr>
-              <a:t>No penicillin </a:t>
-            </a:r>
-            <a:r>
-              <a:rPr lang="en-AU" sz="800" smtClean="0">
-                <a:effectLst/>
-                <a:ea typeface="Calibri" charset="0"/>
-                <a:cs typeface="Calibri" charset="0"/>
-              </a:rPr>
-              <a:t>allergy</a:t>
+              <a:t>No penicillin allergy</a:t>
             </a:r>
             <a:r>
               <a:rPr lang="en-AU" sz="1200">
@@ -43776,7 +44467,7 @@
               <a:t>Patient allergic to </a:t>
             </a:r>
             <a:r>
-              <a:rPr lang="en-AU" sz="800" smtClean="0">
+              <a:rPr lang="en-AU" sz="800">
                 <a:solidFill>
                   <a:schemeClr val="accent2"/>
                 </a:solidFill>
@@ -43931,15 +44622,7 @@
                 <a:ea typeface="Calibri" charset="0"/>
                 <a:cs typeface="Calibri" charset="0"/>
               </a:rPr>
-              <a:t>Choosing </a:t>
-            </a:r>
-            <a:r>
-              <a:rPr lang="en-AU" sz="800" smtClean="0">
-                <a:effectLst/>
-                <a:ea typeface="Calibri" charset="0"/>
-                <a:cs typeface="Calibri" charset="0"/>
-              </a:rPr>
-              <a:t>amoxicillin</a:t>
+              <a:t>Choosing amoxicillin</a:t>
             </a:r>
             <a:endParaRPr lang="en-GB" sz="1200">
               <a:effectLst/>
@@ -44518,7 +45201,7 @@
               <a:t>i</a:t>
             </a:r>
             <a:r>
-              <a:rPr lang="en-AU" sz="800" smtClean="0">
+              <a:rPr lang="en-AU" sz="800">
                 <a:effectLst/>
                 <a:latin typeface="Calibri" charset="0"/>
                 <a:ea typeface="Calibri" charset="0"/>
@@ -44714,7 +45397,7 @@
               </a:spcAft>
             </a:pPr>
             <a:r>
-              <a:rPr lang="en-AU" sz="800" smtClean="0">
+              <a:rPr lang="en-AU" sz="800">
                 <a:effectLst/>
                 <a:ea typeface="Calibri" charset="0"/>
                 <a:cs typeface="Calibri" charset="0"/>
@@ -44798,7 +45481,7 @@
               </a:spcAft>
             </a:pPr>
             <a:r>
-              <a:rPr lang="en-AU" sz="800" smtClean="0">
+              <a:rPr lang="en-AU" sz="800">
                 <a:effectLst/>
                 <a:ea typeface="Calibri" charset="0"/>
                 <a:cs typeface="Calibri" charset="0"/>
@@ -45017,7 +45700,7 @@
               </a:spcAft>
             </a:pPr>
             <a:r>
-              <a:rPr lang="en-AU" sz="800" smtClean="0">
+              <a:rPr lang="en-AU" sz="800">
                 <a:latin typeface="Calibri" charset="0"/>
                 <a:ea typeface="Calibri" charset="0"/>
               </a:rPr>
@@ -45891,7 +46574,7 @@
               </a:spcAft>
             </a:pPr>
             <a:r>
-              <a:rPr lang="en-AU" sz="800" smtClean="0">
+              <a:rPr lang="en-AU" sz="800">
                 <a:solidFill>
                   <a:schemeClr val="tx1"/>
                 </a:solidFill>
@@ -46035,14 +46718,7 @@
                 <a:latin typeface="Calibri" charset="0"/>
                 <a:ea typeface="Calibri" charset="0"/>
               </a:rPr>
-              <a:t>q</a:t>
-            </a:r>
-            <a:r>
-              <a:rPr lang="en-AU" sz="800" smtClean="0">
-                <a:latin typeface="Calibri" charset="0"/>
-                <a:ea typeface="Calibri" charset="0"/>
-              </a:rPr>
-              <a:t>uestion_for_indicating</a:t>
+              <a:t>question_for_indicating</a:t>
             </a:r>
             <a:endParaRPr lang="en-GB" sz="1200">
               <a:effectLst/>
@@ -46324,7 +47000,7 @@
               </a:spcAft>
             </a:pPr>
             <a:r>
-              <a:rPr lang="en-AU" sz="800" smtClean="0">
+              <a:rPr lang="en-AU" sz="800">
                 <a:solidFill>
                   <a:srgbClr val="0070C0"/>
                 </a:solidFill>
@@ -46595,17 +47271,7 @@
                 <a:latin typeface="Calibri" charset="0"/>
                 <a:ea typeface="Calibri" charset="0"/>
               </a:rPr>
-              <a:t>o</a:t>
-            </a:r>
-            <a:r>
-              <a:rPr lang="en-AU" sz="800" smtClean="0">
-                <a:solidFill>
-                  <a:schemeClr val="accent2"/>
-                </a:solidFill>
-                <a:latin typeface="Calibri" charset="0"/>
-                <a:ea typeface="Calibri" charset="0"/>
-              </a:rPr>
-              <a:t>wl:disjointWith</a:t>
+              <a:t>owl:disjointWith</a:t>
             </a:r>
             <a:endParaRPr lang="en-GB" sz="1200">
               <a:solidFill>
@@ -46880,7 +47546,7 @@
               </a:spcAft>
             </a:pPr>
             <a:r>
-              <a:rPr lang="en-AU" sz="800" smtClean="0">
+              <a:rPr lang="en-AU" sz="800">
                 <a:solidFill>
                   <a:srgbClr val="0070C0"/>
                 </a:solidFill>
@@ -47334,14 +48000,7 @@
                 <a:latin typeface="Calibri" charset="0"/>
                 <a:ea typeface="Calibri" charset="0"/>
               </a:rPr>
-              <a:t>i</a:t>
-            </a:r>
-            <a:r>
-              <a:rPr lang="en-AU" sz="800" err="1" smtClean="0">
-                <a:latin typeface="Calibri" charset="0"/>
-                <a:ea typeface="Calibri" charset="0"/>
-              </a:rPr>
-              <a:t>s_consideration_of</a:t>
+              <a:t>is_consideration_of</a:t>
             </a:r>
             <a:endParaRPr lang="en-GB" sz="1200">
               <a:effectLst/>
@@ -47403,7 +48062,7 @@
               </a:spcAft>
             </a:pPr>
             <a:r>
-              <a:rPr lang="en-AU" sz="800" smtClean="0">
+              <a:rPr lang="en-AU" sz="800">
                 <a:solidFill>
                   <a:srgbClr val="C00000"/>
                 </a:solidFill>
@@ -49194,7 +49853,7 @@
           <a:p>
             <a:pPr algn="ctr"/>
             <a:r>
-              <a:rPr lang="en-US" sz="1000" err="1" smtClean="0">
+              <a:rPr lang="en-US" sz="1000" err="1">
                 <a:solidFill>
                   <a:schemeClr val="tx1"/>
                 </a:solidFill>
@@ -49345,7 +50004,7 @@
           <a:p>
             <a:pPr algn="ctr"/>
             <a:r>
-              <a:rPr lang="en-US" sz="1000" err="1" smtClean="0">
+              <a:rPr lang="en-US" sz="1000" err="1">
                 <a:solidFill>
                   <a:schemeClr val="tx1"/>
                 </a:solidFill>
@@ -49405,7 +50064,7 @@
           <a:p>
             <a:pPr algn="ctr"/>
             <a:r>
-              <a:rPr lang="en-US" sz="1000" err="1" smtClean="0">
+              <a:rPr lang="en-US" sz="1000" err="1">
                 <a:solidFill>
                   <a:schemeClr val="tx1"/>
                 </a:solidFill>
@@ -49467,7 +50126,7 @@
           <a:p>
             <a:pPr algn="ctr"/>
             <a:r>
-              <a:rPr lang="en-US" sz="1000" err="1" smtClean="0">
+              <a:rPr lang="en-US" sz="1000" err="1">
                 <a:solidFill>
                   <a:schemeClr val="tx1"/>
                 </a:solidFill>
@@ -49529,7 +50188,7 @@
           <a:p>
             <a:pPr algn="ctr"/>
             <a:r>
-              <a:rPr lang="en-US" sz="1000" err="1" smtClean="0">
+              <a:rPr lang="en-US" sz="1000" err="1">
                 <a:solidFill>
                   <a:schemeClr val="tx1"/>
                 </a:solidFill>
@@ -49591,7 +50250,7 @@
           <a:p>
             <a:pPr algn="ctr"/>
             <a:r>
-              <a:rPr lang="en-US" sz="1000" err="1" smtClean="0">
+              <a:rPr lang="en-US" sz="1000" err="1">
                 <a:solidFill>
                   <a:schemeClr val="tx1"/>
                 </a:solidFill>
@@ -49651,7 +50310,7 @@
           <a:p>
             <a:pPr algn="ctr"/>
             <a:r>
-              <a:rPr lang="en-US" sz="1000" err="1" smtClean="0">
+              <a:rPr lang="en-US" sz="1000" err="1">
                 <a:solidFill>
                   <a:schemeClr val="tx1"/>
                 </a:solidFill>
@@ -51882,7 +52541,7 @@
           <a:p>
             <a:pPr algn="ctr"/>
             <a:r>
-              <a:rPr lang="en-US" sz="1000" err="1" smtClean="0">
+              <a:rPr lang="en-US" sz="1000" err="1">
                 <a:solidFill>
                   <a:schemeClr val="tx1"/>
                 </a:solidFill>
@@ -51944,7 +52603,7 @@
           <a:p>
             <a:pPr algn="ctr"/>
             <a:r>
-              <a:rPr lang="en-US" sz="1000" err="1" smtClean="0">
+              <a:rPr lang="en-US" sz="1000" err="1">
                 <a:solidFill>
                   <a:schemeClr val="tx1"/>
                 </a:solidFill>
@@ -52006,7 +52665,7 @@
           <a:p>
             <a:pPr algn="ctr"/>
             <a:r>
-              <a:rPr lang="en-US" sz="1000" err="1" smtClean="0">
+              <a:rPr lang="en-US" sz="1000" err="1">
                 <a:solidFill>
                   <a:schemeClr val="tx1"/>
                 </a:solidFill>
@@ -52068,7 +52727,7 @@
           <a:p>
             <a:pPr algn="ctr"/>
             <a:r>
-              <a:rPr lang="en-US" sz="1000" err="1" smtClean="0">
+              <a:rPr lang="en-US" sz="1000" err="1">
                 <a:solidFill>
                   <a:schemeClr val="tx1"/>
                 </a:solidFill>
@@ -52130,7 +52789,7 @@
           <a:p>
             <a:pPr algn="ctr"/>
             <a:r>
-              <a:rPr lang="en-US" sz="1000" err="1" smtClean="0">
+              <a:rPr lang="en-US" sz="1000" err="1">
                 <a:solidFill>
                   <a:schemeClr val="tx1"/>
                 </a:solidFill>
@@ -53180,7 +53839,7 @@
               </a:spcAft>
             </a:pPr>
             <a:r>
-              <a:rPr lang="en-AU" sz="1000" smtClean="0">
+              <a:rPr lang="en-AU" sz="1000">
                 <a:effectLst/>
                 <a:ea typeface="Calibri" charset="0"/>
                 <a:cs typeface="Calibri" charset="0"/>
@@ -53324,7 +53983,7 @@
               </a:spcAft>
             </a:pPr>
             <a:r>
-              <a:rPr lang="en-AU" sz="1000" smtClean="0">
+              <a:rPr lang="en-AU" sz="1000">
                 <a:effectLst/>
                 <a:ea typeface="Calibri" charset="0"/>
                 <a:cs typeface="Calibri" charset="0"/>
@@ -53401,7 +54060,7 @@
               </a:spcAft>
             </a:pPr>
             <a:r>
-              <a:rPr lang="en-AU" sz="1000" smtClean="0">
+              <a:rPr lang="en-AU" sz="1000">
                 <a:effectLst/>
                 <a:ea typeface="Calibri" charset="0"/>
                 <a:cs typeface="Calibri" charset="0"/>
@@ -53478,7 +54137,7 @@
               </a:spcAft>
             </a:pPr>
             <a:r>
-              <a:rPr lang="en-AU" sz="1000" smtClean="0">
+              <a:rPr lang="en-AU" sz="1000">
                 <a:effectLst/>
                 <a:ea typeface="Calibri" charset="0"/>
                 <a:cs typeface="Calibri" charset="0"/>
@@ -53555,7 +54214,7 @@
               </a:spcAft>
             </a:pPr>
             <a:r>
-              <a:rPr lang="en-AU" sz="1000" smtClean="0">
+              <a:rPr lang="en-AU" sz="1000">
                 <a:effectLst/>
                 <a:ea typeface="Calibri" charset="0"/>
                 <a:cs typeface="Calibri" charset="0"/>
@@ -55250,7 +55909,7 @@
               </a:spcAft>
             </a:pPr>
             <a:r>
-              <a:rPr lang="en-AU" sz="1000" smtClean="0">
+              <a:rPr lang="en-AU" sz="1000">
                 <a:solidFill>
                   <a:srgbClr val="C00000"/>
                 </a:solidFill>
@@ -55333,7 +55992,7 @@
               </a:spcAft>
             </a:pPr>
             <a:r>
-              <a:rPr lang="en-AU" sz="1000" smtClean="0">
+              <a:rPr lang="en-AU" sz="1000">
                 <a:solidFill>
                   <a:srgbClr val="0070C0"/>
                 </a:solidFill>
@@ -55483,7 +56142,7 @@
               </a:spcAft>
             </a:pPr>
             <a:r>
-              <a:rPr lang="en-AU" sz="1000" smtClean="0">
+              <a:rPr lang="en-AU" sz="1000">
                 <a:latin typeface="Calibri" charset="0"/>
                 <a:ea typeface="Calibri" charset="0"/>
               </a:rPr>
@@ -55634,7 +56293,7 @@
               </a:spcAft>
             </a:pPr>
             <a:r>
-              <a:rPr lang="en-AU" sz="1000" smtClean="0">
+              <a:rPr lang="en-AU" sz="1000">
                 <a:solidFill>
                   <a:srgbClr val="0070C0"/>
                 </a:solidFill>
@@ -55794,7 +56453,7 @@
               </a:spcAft>
             </a:pPr>
             <a:r>
-              <a:rPr lang="en-AU" sz="1000" smtClean="0">
+              <a:rPr lang="en-AU" sz="1000">
                 <a:solidFill>
                   <a:srgbClr val="0070C0"/>
                 </a:solidFill>
@@ -58290,7 +58949,7 @@
           <a:p>
             <a:pPr algn="ctr"/>
             <a:r>
-              <a:rPr lang="en-US" sz="1000" err="1" smtClean="0">
+              <a:rPr lang="en-US" sz="1000" err="1">
                 <a:solidFill>
                   <a:schemeClr val="tx1"/>
                 </a:solidFill>
@@ -58465,7 +59124,7 @@
           <a:p>
             <a:pPr algn="ctr"/>
             <a:r>
-              <a:rPr lang="en-US" sz="1000" err="1" smtClean="0">
+              <a:rPr lang="en-US" sz="1000" err="1">
                 <a:solidFill>
                   <a:schemeClr val="tx1"/>
                 </a:solidFill>
@@ -58797,7 +59456,7 @@
           <a:p>
             <a:pPr algn="ctr"/>
             <a:r>
-              <a:rPr lang="en-US" sz="1000" err="1" smtClean="0">
+              <a:rPr lang="en-US" sz="1000" err="1">
                 <a:solidFill>
                   <a:schemeClr val="tx1"/>
                 </a:solidFill>
@@ -58859,7 +59518,7 @@
           <a:p>
             <a:pPr algn="ctr"/>
             <a:r>
-              <a:rPr lang="en-US" sz="1000" err="1" smtClean="0">
+              <a:rPr lang="en-US" sz="1000" err="1">
                 <a:solidFill>
                   <a:schemeClr val="tx1"/>
                 </a:solidFill>
@@ -58921,7 +59580,7 @@
           <a:p>
             <a:pPr algn="ctr"/>
             <a:r>
-              <a:rPr lang="en-US" sz="1000" err="1" smtClean="0">
+              <a:rPr lang="en-US" sz="1000" err="1">
                 <a:solidFill>
                   <a:schemeClr val="tx1"/>
                 </a:solidFill>
@@ -58983,7 +59642,7 @@
           <a:p>
             <a:pPr algn="ctr"/>
             <a:r>
-              <a:rPr lang="en-US" sz="1000" err="1" smtClean="0">
+              <a:rPr lang="en-US" sz="1000" err="1">
                 <a:solidFill>
                   <a:schemeClr val="tx1"/>
                 </a:solidFill>
@@ -59107,7 +59766,7 @@
           <a:p>
             <a:pPr algn="ctr"/>
             <a:r>
-              <a:rPr lang="en-US" sz="1000" err="1" smtClean="0">
+              <a:rPr lang="en-US" sz="1000" err="1">
                 <a:solidFill>
                   <a:schemeClr val="tx1"/>
                 </a:solidFill>
@@ -59169,7 +59828,7 @@
           <a:p>
             <a:pPr algn="ctr"/>
             <a:r>
-              <a:rPr lang="en-US" sz="1000" err="1" smtClean="0">
+              <a:rPr lang="en-US" sz="1000" err="1">
                 <a:solidFill>
                   <a:schemeClr val="tx1"/>
                 </a:solidFill>
@@ -59635,7 +60294,7 @@
           <a:p>
             <a:pPr algn="ctr"/>
             <a:r>
-              <a:rPr lang="en-US" sz="1000" err="1" smtClean="0">
+              <a:rPr lang="en-US" sz="1000" err="1">
                 <a:solidFill>
                   <a:schemeClr val="tx1"/>
                 </a:solidFill>

</xml_diff>